<commit_message>
update ppt, and add fn example
</commit_message>
<xml_diff>
--- a/RustIntro.pptx
+++ b/RustIntro.pptx
@@ -5,7 +5,7 @@
     <p:sldMasterId id="2147483648" r:id="rId1"/>
   </p:sldMasterIdLst>
   <p:notesMasterIdLst>
-    <p:notesMasterId r:id="rId10"/>
+    <p:notesMasterId r:id="rId11"/>
   </p:notesMasterIdLst>
   <p:sldIdLst>
     <p:sldId id="256" r:id="rId2"/>
@@ -13,9 +13,10 @@
     <p:sldId id="260" r:id="rId4"/>
     <p:sldId id="258" r:id="rId5"/>
     <p:sldId id="259" r:id="rId6"/>
-    <p:sldId id="262" r:id="rId7"/>
-    <p:sldId id="263" r:id="rId8"/>
-    <p:sldId id="261" r:id="rId9"/>
+    <p:sldId id="264" r:id="rId7"/>
+    <p:sldId id="262" r:id="rId8"/>
+    <p:sldId id="263" r:id="rId9"/>
+    <p:sldId id="261" r:id="rId10"/>
   </p:sldIdLst>
   <p:sldSz cx="12192000" cy="6858000"/>
   <p:notesSz cx="6858000" cy="9144000"/>
@@ -204,7 +205,7 @@
           <a:p>
             <a:fld id="{F5D7967C-BE0C-4865-9A87-53F83D2C2106}" type="datetimeFigureOut">
               <a:rPr lang="en-US" smtClean="0"/>
-              <a:t>7/22/2020</a:t>
+              <a:t>7/29/2020</a:t>
             </a:fld>
             <a:endParaRPr lang="en-US"/>
           </a:p>
@@ -620,7 +621,7 @@
           <a:p>
             <a:fld id="{B891341A-8AB9-4FB5-850B-4CBCD13A163C}" type="slidenum">
               <a:rPr lang="en-US" smtClean="0"/>
-              <a:t>8</a:t>
+              <a:t>9</a:t>
             </a:fld>
             <a:endParaRPr lang="en-US"/>
           </a:p>
@@ -786,7 +787,7 @@
           <a:p>
             <a:fld id="{2BE63B19-0516-4569-B712-8EC5C5FC73D7}" type="datetime1">
               <a:rPr lang="en-US" smtClean="0"/>
-              <a:t>7/22/2020</a:t>
+              <a:t>7/29/2020</a:t>
             </a:fld>
             <a:endParaRPr lang="en-US"/>
           </a:p>
@@ -987,7 +988,7 @@
           <a:p>
             <a:fld id="{43868FD8-0AD7-4E1F-9181-3C53BA169C86}" type="datetime1">
               <a:rPr lang="en-US" smtClean="0"/>
-              <a:t>7/22/2020</a:t>
+              <a:t>7/29/2020</a:t>
             </a:fld>
             <a:endParaRPr lang="en-US"/>
           </a:p>
@@ -1198,7 +1199,7 @@
           <a:p>
             <a:fld id="{8ABE26B9-926F-4C00-8E0D-BB88A26F3D37}" type="datetime1">
               <a:rPr lang="en-US" smtClean="0"/>
-              <a:t>7/22/2020</a:t>
+              <a:t>7/29/2020</a:t>
             </a:fld>
             <a:endParaRPr lang="en-US"/>
           </a:p>
@@ -1399,7 +1400,7 @@
           <a:p>
             <a:fld id="{36AE9653-09A4-4A1A-86A2-22EA13F9AAFB}" type="datetime1">
               <a:rPr lang="en-US" smtClean="0"/>
-              <a:t>7/22/2020</a:t>
+              <a:t>7/29/2020</a:t>
             </a:fld>
             <a:endParaRPr lang="en-US"/>
           </a:p>
@@ -1677,7 +1678,7 @@
           <a:p>
             <a:fld id="{FCC1FEA8-435A-48E4-9E4C-E82C791266DE}" type="datetime1">
               <a:rPr lang="en-US" smtClean="0"/>
-              <a:t>7/22/2020</a:t>
+              <a:t>7/29/2020</a:t>
             </a:fld>
             <a:endParaRPr lang="en-US"/>
           </a:p>
@@ -1945,7 +1946,7 @@
           <a:p>
             <a:fld id="{9769E967-A411-4969-B358-58EEDD1723EE}" type="datetime1">
               <a:rPr lang="en-US" smtClean="0"/>
-              <a:t>7/22/2020</a:t>
+              <a:t>7/29/2020</a:t>
             </a:fld>
             <a:endParaRPr lang="en-US"/>
           </a:p>
@@ -2360,7 +2361,7 @@
           <a:p>
             <a:fld id="{26CF9157-5643-4813-B559-CF3A43EAA586}" type="datetime1">
               <a:rPr lang="en-US" smtClean="0"/>
-              <a:t>7/22/2020</a:t>
+              <a:t>7/29/2020</a:t>
             </a:fld>
             <a:endParaRPr lang="en-US"/>
           </a:p>
@@ -2504,7 +2505,7 @@
           <a:p>
             <a:fld id="{E5091FD3-9EDF-4236-9615-03497DEC2F25}" type="datetime1">
               <a:rPr lang="en-US" smtClean="0"/>
-              <a:t>7/22/2020</a:t>
+              <a:t>7/29/2020</a:t>
             </a:fld>
             <a:endParaRPr lang="en-US"/>
           </a:p>
@@ -2620,7 +2621,7 @@
           <a:p>
             <a:fld id="{FD6AEB59-C6D9-473C-94BA-47DA9C5809A3}" type="datetime1">
               <a:rPr lang="en-US" smtClean="0"/>
-              <a:t>7/22/2020</a:t>
+              <a:t>7/29/2020</a:t>
             </a:fld>
             <a:endParaRPr lang="en-US"/>
           </a:p>
@@ -2934,7 +2935,7 @@
           <a:p>
             <a:fld id="{9FFF7D38-572C-4D10-80C7-509477EF5803}" type="datetime1">
               <a:rPr lang="en-US" smtClean="0"/>
-              <a:t>7/22/2020</a:t>
+              <a:t>7/29/2020</a:t>
             </a:fld>
             <a:endParaRPr lang="en-US"/>
           </a:p>
@@ -3225,7 +3226,7 @@
           <a:p>
             <a:fld id="{63251C4F-8DAA-445A-9204-38B149BE527B}" type="datetime1">
               <a:rPr lang="en-US" smtClean="0"/>
-              <a:t>7/22/2020</a:t>
+              <a:t>7/29/2020</a:t>
             </a:fld>
             <a:endParaRPr lang="en-US"/>
           </a:p>
@@ -3469,7 +3470,7 @@
           <a:p>
             <a:fld id="{9C53D9E6-3555-485D-B762-D68C9D979839}" type="datetime1">
               <a:rPr lang="en-US" smtClean="0"/>
-              <a:t>7/22/2020</a:t>
+              <a:t>7/29/2020</a:t>
             </a:fld>
             <a:endParaRPr lang="en-US"/>
           </a:p>
@@ -7384,6 +7385,575 @@
     <p:bg>
       <p:bgPr>
         <a:solidFill>
+          <a:schemeClr val="bg1">
+            <a:tint val="95000"/>
+            <a:satMod val="170000"/>
+          </a:schemeClr>
+        </a:solidFill>
+        <a:effectLst/>
+      </p:bgPr>
+    </p:bg>
+    <p:spTree>
+      <p:nvGrpSpPr>
+        <p:cNvPr id="1" name=""/>
+        <p:cNvGrpSpPr/>
+        <p:nvPr/>
+      </p:nvGrpSpPr>
+      <p:grpSpPr>
+        <a:xfrm>
+          <a:off x="0" y="0"/>
+          <a:ext cx="0" cy="0"/>
+          <a:chOff x="0" y="0"/>
+          <a:chExt cx="0" cy="0"/>
+        </a:xfrm>
+      </p:grpSpPr>
+      <p:sp>
+        <p:nvSpPr>
+          <p:cNvPr id="2" name="Title 1">
+            <a:extLst>
+              <a:ext uri="{FF2B5EF4-FFF2-40B4-BE49-F238E27FC236}">
+                <a16:creationId xmlns:a16="http://schemas.microsoft.com/office/drawing/2014/main" id="{E4326CFC-8929-4EAA-AACB-65A09AC72B19}"/>
+              </a:ext>
+            </a:extLst>
+          </p:cNvPr>
+          <p:cNvSpPr>
+            <a:spLocks noGrp="1"/>
+          </p:cNvSpPr>
+          <p:nvPr>
+            <p:ph type="title"/>
+          </p:nvPr>
+        </p:nvSpPr>
+        <p:spPr>
+          <a:xfrm>
+            <a:off x="804673" y="1445494"/>
+            <a:ext cx="3616856" cy="4376572"/>
+          </a:xfrm>
+        </p:spPr>
+        <p:txBody>
+          <a:bodyPr anchor="ctr">
+            <a:normAutofit/>
+          </a:bodyPr>
+          <a:lstStyle/>
+          <a:p>
+            <a:r>
+              <a:rPr lang="en-US" sz="4800" dirty="0"/>
+              <a:t>Variables and Functions</a:t>
+            </a:r>
+          </a:p>
+        </p:txBody>
+      </p:sp>
+      <p:sp>
+        <p:nvSpPr>
+          <p:cNvPr id="8" name="Freeform: Shape 7">
+            <a:extLst>
+              <a:ext uri="{FF2B5EF4-FFF2-40B4-BE49-F238E27FC236}">
+                <a16:creationId xmlns:a16="http://schemas.microsoft.com/office/drawing/2014/main" id="{DFF2AC85-FAA0-4844-813F-83C04D7382E2}"/>
+              </a:ext>
+              <a:ext uri="{C183D7F6-B498-43B3-948B-1728B52AA6E4}">
+                <adec:decorative xmlns:adec="http://schemas.microsoft.com/office/drawing/2017/decorative" val="1"/>
+              </a:ext>
+            </a:extLst>
+          </p:cNvPr>
+          <p:cNvSpPr>
+            <a:spLocks noGrp="1" noRot="1" noChangeAspect="1" noMove="1" noResize="1" noEditPoints="1" noAdjustHandles="1" noChangeArrowheads="1" noChangeShapeType="1" noTextEdit="1"/>
+          </p:cNvSpPr>
+          <p:nvPr>
+            <p:extLst>
+              <p:ext uri="{386F3935-93C4-4BCD-93E2-E3B085C9AB24}">
+                <p16:designElem xmlns:p16="http://schemas.microsoft.com/office/powerpoint/2015/main" val="1"/>
+              </p:ext>
+            </p:extLst>
+          </p:nvPr>
+        </p:nvSpPr>
+        <p:spPr>
+          <a:xfrm>
+            <a:off x="4907636" y="0"/>
+            <a:ext cx="7281316" cy="6858000"/>
+          </a:xfrm>
+          <a:custGeom>
+            <a:avLst/>
+            <a:gdLst>
+              <a:gd name="connsiteX0" fmla="*/ 361354 w 7281316"/>
+              <a:gd name="connsiteY0" fmla="*/ 0 h 6858000"/>
+              <a:gd name="connsiteX1" fmla="*/ 7281316 w 7281316"/>
+              <a:gd name="connsiteY1" fmla="*/ 0 h 6858000"/>
+              <a:gd name="connsiteX2" fmla="*/ 7281316 w 7281316"/>
+              <a:gd name="connsiteY2" fmla="*/ 6858000 h 6858000"/>
+              <a:gd name="connsiteX3" fmla="*/ 696735 w 7281316"/>
+              <a:gd name="connsiteY3" fmla="*/ 6858000 h 6858000"/>
+              <a:gd name="connsiteX4" fmla="*/ 690849 w 7281316"/>
+              <a:gd name="connsiteY4" fmla="*/ 6842426 h 6858000"/>
+              <a:gd name="connsiteX5" fmla="*/ 335637 w 7281316"/>
+              <a:gd name="connsiteY5" fmla="*/ 94722 h 6858000"/>
+            </a:gdLst>
+            <a:ahLst/>
+            <a:cxnLst>
+              <a:cxn ang="0">
+                <a:pos x="connsiteX0" y="connsiteY0"/>
+              </a:cxn>
+              <a:cxn ang="0">
+                <a:pos x="connsiteX1" y="connsiteY1"/>
+              </a:cxn>
+              <a:cxn ang="0">
+                <a:pos x="connsiteX2" y="connsiteY2"/>
+              </a:cxn>
+              <a:cxn ang="0">
+                <a:pos x="connsiteX3" y="connsiteY3"/>
+              </a:cxn>
+              <a:cxn ang="0">
+                <a:pos x="connsiteX4" y="connsiteY4"/>
+              </a:cxn>
+              <a:cxn ang="0">
+                <a:pos x="connsiteX5" y="connsiteY5"/>
+              </a:cxn>
+            </a:cxnLst>
+            <a:rect l="l" t="t" r="r" b="b"/>
+            <a:pathLst>
+              <a:path w="7281316" h="6858000">
+                <a:moveTo>
+                  <a:pt x="361354" y="0"/>
+                </a:moveTo>
+                <a:lnTo>
+                  <a:pt x="7281316" y="0"/>
+                </a:lnTo>
+                <a:lnTo>
+                  <a:pt x="7281316" y="6858000"/>
+                </a:lnTo>
+                <a:lnTo>
+                  <a:pt x="696735" y="6858000"/>
+                </a:lnTo>
+                <a:lnTo>
+                  <a:pt x="690849" y="6842426"/>
+                </a:lnTo>
+                <a:cubicBezTo>
+                  <a:pt x="-65870" y="4704140"/>
+                  <a:pt x="-226206" y="2374054"/>
+                  <a:pt x="335637" y="94722"/>
+                </a:cubicBezTo>
+                <a:close/>
+              </a:path>
+            </a:pathLst>
+          </a:custGeom>
+          <a:solidFill>
+            <a:schemeClr val="tx1">
+              <a:alpha val="80000"/>
+            </a:schemeClr>
+          </a:solidFill>
+          <a:ln>
+            <a:noFill/>
+          </a:ln>
+        </p:spPr>
+        <p:style>
+          <a:lnRef idx="2">
+            <a:schemeClr val="accent1">
+              <a:shade val="50000"/>
+            </a:schemeClr>
+          </a:lnRef>
+          <a:fillRef idx="1">
+            <a:schemeClr val="accent1"/>
+          </a:fillRef>
+          <a:effectRef idx="0">
+            <a:schemeClr val="accent1"/>
+          </a:effectRef>
+          <a:fontRef idx="minor">
+            <a:schemeClr val="lt1"/>
+          </a:fontRef>
+        </p:style>
+        <p:txBody>
+          <a:bodyPr rtlCol="0" anchor="ctr"/>
+          <a:lstStyle/>
+          <a:p>
+            <a:pPr algn="ctr"/>
+            <a:endParaRPr lang="en-US"/>
+          </a:p>
+        </p:txBody>
+      </p:sp>
+      <p:sp>
+        <p:nvSpPr>
+          <p:cNvPr id="10" name="Freeform: Shape 9">
+            <a:extLst>
+              <a:ext uri="{FF2B5EF4-FFF2-40B4-BE49-F238E27FC236}">
+                <a16:creationId xmlns:a16="http://schemas.microsoft.com/office/drawing/2014/main" id="{89CC0F1E-BAA2-47B1-8F83-7ECB9FD9E009}"/>
+              </a:ext>
+              <a:ext uri="{C183D7F6-B498-43B3-948B-1728B52AA6E4}">
+                <adec:decorative xmlns:adec="http://schemas.microsoft.com/office/drawing/2017/decorative" val="1"/>
+              </a:ext>
+            </a:extLst>
+          </p:cNvPr>
+          <p:cNvSpPr>
+            <a:spLocks noGrp="1" noRot="1" noChangeAspect="1" noMove="1" noResize="1" noEditPoints="1" noAdjustHandles="1" noChangeArrowheads="1" noChangeShapeType="1" noTextEdit="1"/>
+          </p:cNvSpPr>
+          <p:nvPr>
+            <p:extLst>
+              <p:ext uri="{386F3935-93C4-4BCD-93E2-E3B085C9AB24}">
+                <p16:designElem xmlns:p16="http://schemas.microsoft.com/office/powerpoint/2015/main" val="1"/>
+              </p:ext>
+            </p:extLst>
+          </p:nvPr>
+        </p:nvSpPr>
+        <p:spPr>
+          <a:xfrm>
+            <a:off x="5189558" y="0"/>
+            <a:ext cx="6999394" cy="6858000"/>
+          </a:xfrm>
+          <a:custGeom>
+            <a:avLst/>
+            <a:gdLst>
+              <a:gd name="connsiteX0" fmla="*/ 6999394 w 6999394"/>
+              <a:gd name="connsiteY0" fmla="*/ 0 h 6858000"/>
+              <a:gd name="connsiteX1" fmla="*/ 6999394 w 6999394"/>
+              <a:gd name="connsiteY1" fmla="*/ 6858000 h 6858000"/>
+              <a:gd name="connsiteX2" fmla="*/ 717029 w 6999394"/>
+              <a:gd name="connsiteY2" fmla="*/ 6858000 h 6858000"/>
+              <a:gd name="connsiteX3" fmla="*/ 623642 w 6999394"/>
+              <a:gd name="connsiteY3" fmla="*/ 6599363 h 6858000"/>
+              <a:gd name="connsiteX4" fmla="*/ 319533 w 6999394"/>
+              <a:gd name="connsiteY4" fmla="*/ 193787 h 6858000"/>
+              <a:gd name="connsiteX5" fmla="*/ 371685 w 6999394"/>
+              <a:gd name="connsiteY5" fmla="*/ 1 h 6858000"/>
+            </a:gdLst>
+            <a:ahLst/>
+            <a:cxnLst>
+              <a:cxn ang="0">
+                <a:pos x="connsiteX0" y="connsiteY0"/>
+              </a:cxn>
+              <a:cxn ang="0">
+                <a:pos x="connsiteX1" y="connsiteY1"/>
+              </a:cxn>
+              <a:cxn ang="0">
+                <a:pos x="connsiteX2" y="connsiteY2"/>
+              </a:cxn>
+              <a:cxn ang="0">
+                <a:pos x="connsiteX3" y="connsiteY3"/>
+              </a:cxn>
+              <a:cxn ang="0">
+                <a:pos x="connsiteX4" y="connsiteY4"/>
+              </a:cxn>
+              <a:cxn ang="0">
+                <a:pos x="connsiteX5" y="connsiteY5"/>
+              </a:cxn>
+            </a:cxnLst>
+            <a:rect l="l" t="t" r="r" b="b"/>
+            <a:pathLst>
+              <a:path w="6999394" h="6858000">
+                <a:moveTo>
+                  <a:pt x="6999394" y="0"/>
+                </a:moveTo>
+                <a:lnTo>
+                  <a:pt x="6999394" y="6858000"/>
+                </a:lnTo>
+                <a:lnTo>
+                  <a:pt x="717029" y="6858000"/>
+                </a:lnTo>
+                <a:lnTo>
+                  <a:pt x="623642" y="6599363"/>
+                </a:lnTo>
+                <a:cubicBezTo>
+                  <a:pt x="-67685" y="4563346"/>
+                  <a:pt x="-206622" y="2355719"/>
+                  <a:pt x="319533" y="193787"/>
+                </a:cubicBezTo>
+                <a:lnTo>
+                  <a:pt x="371685" y="1"/>
+                </a:lnTo>
+                <a:close/>
+              </a:path>
+            </a:pathLst>
+          </a:custGeom>
+          <a:solidFill>
+            <a:schemeClr val="tx1">
+              <a:alpha val="80000"/>
+            </a:schemeClr>
+          </a:solidFill>
+          <a:ln>
+            <a:noFill/>
+          </a:ln>
+        </p:spPr>
+        <p:style>
+          <a:lnRef idx="2">
+            <a:schemeClr val="accent1">
+              <a:shade val="50000"/>
+            </a:schemeClr>
+          </a:lnRef>
+          <a:fillRef idx="1">
+            <a:schemeClr val="accent1"/>
+          </a:fillRef>
+          <a:effectRef idx="0">
+            <a:schemeClr val="accent1"/>
+          </a:effectRef>
+          <a:fontRef idx="minor">
+            <a:schemeClr val="lt1"/>
+          </a:fontRef>
+        </p:style>
+        <p:txBody>
+          <a:bodyPr rtlCol="0" anchor="ctr"/>
+          <a:lstStyle/>
+          <a:p>
+            <a:pPr algn="ctr"/>
+            <a:endParaRPr lang="en-US"/>
+          </a:p>
+        </p:txBody>
+      </p:sp>
+      <p:sp>
+        <p:nvSpPr>
+          <p:cNvPr id="3" name="Content Placeholder 2">
+            <a:extLst>
+              <a:ext uri="{FF2B5EF4-FFF2-40B4-BE49-F238E27FC236}">
+                <a16:creationId xmlns:a16="http://schemas.microsoft.com/office/drawing/2014/main" id="{2FB1E0C6-7382-4D7D-9B97-0DF48018236C}"/>
+              </a:ext>
+            </a:extLst>
+          </p:cNvPr>
+          <p:cNvSpPr>
+            <a:spLocks noGrp="1"/>
+          </p:cNvSpPr>
+          <p:nvPr>
+            <p:ph idx="1"/>
+          </p:nvPr>
+        </p:nvSpPr>
+        <p:spPr>
+          <a:xfrm>
+            <a:off x="6096000" y="478971"/>
+            <a:ext cx="5501834" cy="5609191"/>
+          </a:xfrm>
+        </p:spPr>
+        <p:txBody>
+          <a:bodyPr anchor="ctr">
+            <a:normAutofit/>
+          </a:bodyPr>
+          <a:lstStyle/>
+          <a:p>
+            <a:pPr marL="0" indent="0">
+              <a:buNone/>
+            </a:pPr>
+            <a:r>
+              <a:rPr lang="en-US" sz="2200" dirty="0">
+                <a:solidFill>
+                  <a:schemeClr val="bg1"/>
+                </a:solidFill>
+              </a:rPr>
+              <a:t>Rust code uses snake case as the conventional style for function and variable names.</a:t>
+            </a:r>
+          </a:p>
+          <a:p>
+            <a:pPr marL="0" indent="0">
+              <a:buNone/>
+            </a:pPr>
+            <a:endParaRPr lang="en-US" sz="2200" dirty="0">
+              <a:solidFill>
+                <a:schemeClr val="bg1"/>
+              </a:solidFill>
+            </a:endParaRPr>
+          </a:p>
+          <a:p>
+            <a:pPr marL="0" indent="0">
+              <a:buNone/>
+            </a:pPr>
+            <a:endParaRPr lang="en-US" sz="2200" dirty="0">
+              <a:solidFill>
+                <a:schemeClr val="bg1"/>
+              </a:solidFill>
+            </a:endParaRPr>
+          </a:p>
+        </p:txBody>
+      </p:sp>
+      <p:sp>
+        <p:nvSpPr>
+          <p:cNvPr id="4" name="Footer Placeholder 3">
+            <a:extLst>
+              <a:ext uri="{FF2B5EF4-FFF2-40B4-BE49-F238E27FC236}">
+                <a16:creationId xmlns:a16="http://schemas.microsoft.com/office/drawing/2014/main" id="{983E1BA2-D9FD-41BC-AC0D-55687EE8BF9E}"/>
+              </a:ext>
+            </a:extLst>
+          </p:cNvPr>
+          <p:cNvSpPr>
+            <a:spLocks noGrp="1"/>
+          </p:cNvSpPr>
+          <p:nvPr>
+            <p:ph type="ftr" sz="quarter" idx="11"/>
+          </p:nvPr>
+        </p:nvSpPr>
+        <p:spPr>
+          <a:xfrm>
+            <a:off x="237935" y="5822066"/>
+            <a:ext cx="4750331" cy="1014597"/>
+          </a:xfrm>
+        </p:spPr>
+        <p:txBody>
+          <a:bodyPr/>
+          <a:lstStyle/>
+          <a:p>
+            <a:pPr algn="l"/>
+            <a:r>
+              <a:rPr lang="en-US" dirty="0">
+                <a:hlinkClick r:id="rId2"/>
+              </a:rPr>
+              <a:t>https://doc.rust-lang.org/book/ch03-03-how-functions-work.html</a:t>
+            </a:r>
+            <a:endParaRPr lang="en-US" dirty="0"/>
+          </a:p>
+        </p:txBody>
+      </p:sp>
+      <p:pic>
+        <p:nvPicPr>
+          <p:cNvPr id="9" name="Picture 8" descr="A screenshot of a cell phone&#10;&#10;Description automatically generated">
+            <a:extLst>
+              <a:ext uri="{FF2B5EF4-FFF2-40B4-BE49-F238E27FC236}">
+                <a16:creationId xmlns:a16="http://schemas.microsoft.com/office/drawing/2014/main" id="{90A2BA45-C722-43BA-820F-9C26B1C0DD62}"/>
+              </a:ext>
+            </a:extLst>
+          </p:cNvPr>
+          <p:cNvPicPr>
+            <a:picLocks noChangeAspect="1"/>
+          </p:cNvPicPr>
+          <p:nvPr/>
+        </p:nvPicPr>
+        <p:blipFill>
+          <a:blip r:embed="rId3">
+            <a:extLst>
+              <a:ext uri="{28A0092B-C50C-407E-A947-70E740481C1C}">
+                <a14:useLocalDpi xmlns:a14="http://schemas.microsoft.com/office/drawing/2010/main" val="0"/>
+              </a:ext>
+            </a:extLst>
+          </a:blip>
+          <a:stretch>
+            <a:fillRect/>
+          </a:stretch>
+        </p:blipFill>
+        <p:spPr>
+          <a:xfrm>
+            <a:off x="5674649" y="3578578"/>
+            <a:ext cx="6344535" cy="1648055"/>
+          </a:xfrm>
+          <a:prstGeom prst="rect">
+            <a:avLst/>
+          </a:prstGeom>
+        </p:spPr>
+      </p:pic>
+    </p:spTree>
+    <p:extLst>
+      <p:ext uri="{BB962C8B-B14F-4D97-AF65-F5344CB8AC3E}">
+        <p14:creationId xmlns:p14="http://schemas.microsoft.com/office/powerpoint/2010/main" val="4052883109"/>
+      </p:ext>
+    </p:extLst>
+  </p:cSld>
+  <p:clrMapOvr>
+    <a:overrideClrMapping bg1="dk1" tx1="lt1" bg2="dk2" tx2="lt2" accent1="accent1" accent2="accent2" accent3="accent3" accent4="accent4" accent5="accent5" accent6="accent6" hlink="hlink" folHlink="folHlink"/>
+  </p:clrMapOvr>
+  <mc:AlternateContent xmlns:mc="http://schemas.openxmlformats.org/markup-compatibility/2006" xmlns:p14="http://schemas.microsoft.com/office/powerpoint/2010/main">
+    <mc:Choice Requires="p14">
+      <p:transition spd="med" p14:dur="700">
+        <p:fade/>
+      </p:transition>
+    </mc:Choice>
+    <mc:Fallback xmlns="">
+      <p:transition spd="med">
+        <p:fade/>
+      </p:transition>
+    </mc:Fallback>
+  </mc:AlternateContent>
+  <p:timing>
+    <p:tnLst>
+      <p:par>
+        <p:cTn id="1" dur="indefinite" restart="never" nodeType="tmRoot">
+          <p:childTnLst>
+            <p:seq concurrent="1" nextAc="seek">
+              <p:cTn id="2" dur="indefinite" nodeType="mainSeq">
+                <p:childTnLst>
+                  <p:par>
+                    <p:cTn id="3" fill="hold">
+                      <p:stCondLst>
+                        <p:cond delay="indefinite"/>
+                      </p:stCondLst>
+                      <p:childTnLst>
+                        <p:par>
+                          <p:cTn id="4" fill="hold">
+                            <p:stCondLst>
+                              <p:cond delay="0"/>
+                            </p:stCondLst>
+                            <p:childTnLst>
+                              <p:par>
+                                <p:cTn id="5" presetID="10" presetClass="entr" presetSubtype="0" fill="hold" grpId="0" nodeType="clickEffect">
+                                  <p:stCondLst>
+                                    <p:cond delay="0"/>
+                                  </p:stCondLst>
+                                  <p:childTnLst>
+                                    <p:set>
+                                      <p:cBhvr>
+                                        <p:cTn id="6" dur="1" fill="hold">
+                                          <p:stCondLst>
+                                            <p:cond delay="0"/>
+                                          </p:stCondLst>
+                                        </p:cTn>
+                                        <p:tgtEl>
+                                          <p:spTgt spid="3">
+                                            <p:txEl>
+                                              <p:pRg st="0" end="0"/>
+                                            </p:txEl>
+                                          </p:spTgt>
+                                        </p:tgtEl>
+                                        <p:attrNameLst>
+                                          <p:attrName>style.visibility</p:attrName>
+                                        </p:attrNameLst>
+                                      </p:cBhvr>
+                                      <p:to>
+                                        <p:strVal val="visible"/>
+                                      </p:to>
+                                    </p:set>
+                                    <p:animEffect transition="in" filter="fade">
+                                      <p:cBhvr>
+                                        <p:cTn id="7" dur="500"/>
+                                        <p:tgtEl>
+                                          <p:spTgt spid="3">
+                                            <p:txEl>
+                                              <p:pRg st="0" end="0"/>
+                                            </p:txEl>
+                                          </p:spTgt>
+                                        </p:tgtEl>
+                                      </p:cBhvr>
+                                    </p:animEffect>
+                                  </p:childTnLst>
+                                </p:cTn>
+                              </p:par>
+                            </p:childTnLst>
+                          </p:cTn>
+                        </p:par>
+                      </p:childTnLst>
+                    </p:cTn>
+                  </p:par>
+                </p:childTnLst>
+              </p:cTn>
+              <p:prevCondLst>
+                <p:cond evt="onPrev" delay="0">
+                  <p:tgtEl>
+                    <p:sldTgt/>
+                  </p:tgtEl>
+                </p:cond>
+              </p:prevCondLst>
+              <p:nextCondLst>
+                <p:cond evt="onNext" delay="0">
+                  <p:tgtEl>
+                    <p:sldTgt/>
+                  </p:tgtEl>
+                </p:cond>
+              </p:nextCondLst>
+            </p:seq>
+          </p:childTnLst>
+        </p:cTn>
+      </p:par>
+    </p:tnLst>
+    <p:bldLst>
+      <p:bldP spid="3" grpId="0" build="p"/>
+    </p:bldLst>
+  </p:timing>
+</p:sld>
+</file>
+
+<file path=ppt/slides/slide7.xml><?xml version="1.0" encoding="utf-8"?>
+<p:sld xmlns:a="http://schemas.openxmlformats.org/drawingml/2006/main" xmlns:r="http://schemas.openxmlformats.org/officeDocument/2006/relationships" xmlns:p="http://schemas.openxmlformats.org/presentationml/2006/main">
+  <p:cSld>
+    <p:bg>
+      <p:bgPr>
+        <a:solidFill>
           <a:schemeClr val="bg1"/>
         </a:solidFill>
         <a:effectLst/>
@@ -7612,7 +8182,7 @@
 </p:sld>
 </file>
 
-<file path=ppt/slides/slide7.xml><?xml version="1.0" encoding="utf-8"?>
+<file path=ppt/slides/slide8.xml><?xml version="1.0" encoding="utf-8"?>
 <p:sld xmlns:a="http://schemas.openxmlformats.org/drawingml/2006/main" xmlns:r="http://schemas.openxmlformats.org/officeDocument/2006/relationships" xmlns:p="http://schemas.openxmlformats.org/presentationml/2006/main">
   <p:cSld>
     <p:bg>
@@ -7812,7 +8382,7 @@
 </p:sld>
 </file>
 
-<file path=ppt/slides/slide8.xml><?xml version="1.0" encoding="utf-8"?>
+<file path=ppt/slides/slide9.xml><?xml version="1.0" encoding="utf-8"?>
 <p:sld xmlns:a="http://schemas.openxmlformats.org/drawingml/2006/main" xmlns:r="http://schemas.openxmlformats.org/officeDocument/2006/relationships" xmlns:p="http://schemas.openxmlformats.org/presentationml/2006/main">
   <p:cSld>
     <p:bg>

</xml_diff>

<commit_message>
add ownership img/ppt example
</commit_message>
<xml_diff>
--- a/RustIntro.pptx
+++ b/RustIntro.pptx
@@ -5,7 +5,7 @@
     <p:sldMasterId id="2147483648" r:id="rId1"/>
   </p:sldMasterIdLst>
   <p:notesMasterIdLst>
-    <p:notesMasterId r:id="rId13"/>
+    <p:notesMasterId r:id="rId14"/>
   </p:notesMasterIdLst>
   <p:sldIdLst>
     <p:sldId id="256" r:id="rId2"/>
@@ -14,11 +14,12 @@
     <p:sldId id="260" r:id="rId5"/>
     <p:sldId id="258" r:id="rId6"/>
     <p:sldId id="259" r:id="rId7"/>
-    <p:sldId id="264" r:id="rId8"/>
-    <p:sldId id="262" r:id="rId9"/>
-    <p:sldId id="263" r:id="rId10"/>
-    <p:sldId id="266" r:id="rId11"/>
-    <p:sldId id="261" r:id="rId12"/>
+    <p:sldId id="267" r:id="rId8"/>
+    <p:sldId id="264" r:id="rId9"/>
+    <p:sldId id="262" r:id="rId10"/>
+    <p:sldId id="263" r:id="rId11"/>
+    <p:sldId id="266" r:id="rId12"/>
+    <p:sldId id="261" r:id="rId13"/>
   </p:sldIdLst>
   <p:sldSz cx="12192000" cy="6858000"/>
   <p:notesSz cx="6858000" cy="9144000"/>
@@ -207,7 +208,7 @@
           <a:p>
             <a:fld id="{F5D7967C-BE0C-4865-9A87-53F83D2C2106}" type="datetimeFigureOut">
               <a:rPr lang="en-US" smtClean="0"/>
-              <a:t>7/29/2020</a:t>
+              <a:t>8/12/2020</a:t>
             </a:fld>
             <a:endParaRPr lang="en-US"/>
           </a:p>
@@ -707,7 +708,91 @@
           <a:p>
             <a:fld id="{B891341A-8AB9-4FB5-850B-4CBCD13A163C}" type="slidenum">
               <a:rPr lang="en-US" smtClean="0"/>
-              <a:t>11</a:t>
+              <a:t>7</a:t>
+            </a:fld>
+            <a:endParaRPr lang="en-US"/>
+          </a:p>
+        </p:txBody>
+      </p:sp>
+    </p:spTree>
+    <p:extLst>
+      <p:ext uri="{BB962C8B-B14F-4D97-AF65-F5344CB8AC3E}">
+        <p14:creationId xmlns:p14="http://schemas.microsoft.com/office/powerpoint/2010/main" val="979753538"/>
+      </p:ext>
+    </p:extLst>
+  </p:cSld>
+  <p:clrMapOvr>
+    <a:masterClrMapping/>
+  </p:clrMapOvr>
+</p:notes>
+</file>
+
+<file path=ppt/notesSlides/notesSlide4.xml><?xml version="1.0" encoding="utf-8"?>
+<p:notes xmlns:a="http://schemas.openxmlformats.org/drawingml/2006/main" xmlns:r="http://schemas.openxmlformats.org/officeDocument/2006/relationships" xmlns:p="http://schemas.openxmlformats.org/presentationml/2006/main">
+  <p:cSld>
+    <p:spTree>
+      <p:nvGrpSpPr>
+        <p:cNvPr id="1" name=""/>
+        <p:cNvGrpSpPr/>
+        <p:nvPr/>
+      </p:nvGrpSpPr>
+      <p:grpSpPr>
+        <a:xfrm>
+          <a:off x="0" y="0"/>
+          <a:ext cx="0" cy="0"/>
+          <a:chOff x="0" y="0"/>
+          <a:chExt cx="0" cy="0"/>
+        </a:xfrm>
+      </p:grpSpPr>
+      <p:sp>
+        <p:nvSpPr>
+          <p:cNvPr id="2" name="Slide Image Placeholder 1"/>
+          <p:cNvSpPr>
+            <a:spLocks noGrp="1" noRot="1" noChangeAspect="1"/>
+          </p:cNvSpPr>
+          <p:nvPr>
+            <p:ph type="sldImg"/>
+          </p:nvPr>
+        </p:nvSpPr>
+        <p:spPr/>
+      </p:sp>
+      <p:sp>
+        <p:nvSpPr>
+          <p:cNvPr id="3" name="Notes Placeholder 2"/>
+          <p:cNvSpPr>
+            <a:spLocks noGrp="1"/>
+          </p:cNvSpPr>
+          <p:nvPr>
+            <p:ph type="body" idx="1"/>
+          </p:nvPr>
+        </p:nvSpPr>
+        <p:spPr/>
+        <p:txBody>
+          <a:bodyPr/>
+          <a:lstStyle/>
+          <a:p>
+            <a:endParaRPr lang="en-US" dirty="0"/>
+          </a:p>
+        </p:txBody>
+      </p:sp>
+      <p:sp>
+        <p:nvSpPr>
+          <p:cNvPr id="4" name="Slide Number Placeholder 3"/>
+          <p:cNvSpPr>
+            <a:spLocks noGrp="1"/>
+          </p:cNvSpPr>
+          <p:nvPr>
+            <p:ph type="sldNum" sz="quarter" idx="5"/>
+          </p:nvPr>
+        </p:nvSpPr>
+        <p:spPr/>
+        <p:txBody>
+          <a:bodyPr/>
+          <a:lstStyle/>
+          <a:p>
+            <a:fld id="{B891341A-8AB9-4FB5-850B-4CBCD13A163C}" type="slidenum">
+              <a:rPr lang="en-US" smtClean="0"/>
+              <a:t>12</a:t>
             </a:fld>
             <a:endParaRPr lang="en-US"/>
           </a:p>
@@ -873,7 +958,7 @@
           <a:p>
             <a:fld id="{2BE63B19-0516-4569-B712-8EC5C5FC73D7}" type="datetime1">
               <a:rPr lang="en-US" smtClean="0"/>
-              <a:t>7/29/2020</a:t>
+              <a:t>8/12/2020</a:t>
             </a:fld>
             <a:endParaRPr lang="en-US"/>
           </a:p>
@@ -1074,7 +1159,7 @@
           <a:p>
             <a:fld id="{43868FD8-0AD7-4E1F-9181-3C53BA169C86}" type="datetime1">
               <a:rPr lang="en-US" smtClean="0"/>
-              <a:t>7/29/2020</a:t>
+              <a:t>8/12/2020</a:t>
             </a:fld>
             <a:endParaRPr lang="en-US"/>
           </a:p>
@@ -1285,7 +1370,7 @@
           <a:p>
             <a:fld id="{8ABE26B9-926F-4C00-8E0D-BB88A26F3D37}" type="datetime1">
               <a:rPr lang="en-US" smtClean="0"/>
-              <a:t>7/29/2020</a:t>
+              <a:t>8/12/2020</a:t>
             </a:fld>
             <a:endParaRPr lang="en-US"/>
           </a:p>
@@ -1486,7 +1571,7 @@
           <a:p>
             <a:fld id="{36AE9653-09A4-4A1A-86A2-22EA13F9AAFB}" type="datetime1">
               <a:rPr lang="en-US" smtClean="0"/>
-              <a:t>7/29/2020</a:t>
+              <a:t>8/12/2020</a:t>
             </a:fld>
             <a:endParaRPr lang="en-US"/>
           </a:p>
@@ -1764,7 +1849,7 @@
           <a:p>
             <a:fld id="{FCC1FEA8-435A-48E4-9E4C-E82C791266DE}" type="datetime1">
               <a:rPr lang="en-US" smtClean="0"/>
-              <a:t>7/29/2020</a:t>
+              <a:t>8/12/2020</a:t>
             </a:fld>
             <a:endParaRPr lang="en-US"/>
           </a:p>
@@ -2032,7 +2117,7 @@
           <a:p>
             <a:fld id="{9769E967-A411-4969-B358-58EEDD1723EE}" type="datetime1">
               <a:rPr lang="en-US" smtClean="0"/>
-              <a:t>7/29/2020</a:t>
+              <a:t>8/12/2020</a:t>
             </a:fld>
             <a:endParaRPr lang="en-US"/>
           </a:p>
@@ -2447,7 +2532,7 @@
           <a:p>
             <a:fld id="{26CF9157-5643-4813-B559-CF3A43EAA586}" type="datetime1">
               <a:rPr lang="en-US" smtClean="0"/>
-              <a:t>7/29/2020</a:t>
+              <a:t>8/12/2020</a:t>
             </a:fld>
             <a:endParaRPr lang="en-US"/>
           </a:p>
@@ -2591,7 +2676,7 @@
           <a:p>
             <a:fld id="{E5091FD3-9EDF-4236-9615-03497DEC2F25}" type="datetime1">
               <a:rPr lang="en-US" smtClean="0"/>
-              <a:t>7/29/2020</a:t>
+              <a:t>8/12/2020</a:t>
             </a:fld>
             <a:endParaRPr lang="en-US"/>
           </a:p>
@@ -2707,7 +2792,7 @@
           <a:p>
             <a:fld id="{FD6AEB59-C6D9-473C-94BA-47DA9C5809A3}" type="datetime1">
               <a:rPr lang="en-US" smtClean="0"/>
-              <a:t>7/29/2020</a:t>
+              <a:t>8/12/2020</a:t>
             </a:fld>
             <a:endParaRPr lang="en-US"/>
           </a:p>
@@ -3021,7 +3106,7 @@
           <a:p>
             <a:fld id="{9FFF7D38-572C-4D10-80C7-509477EF5803}" type="datetime1">
               <a:rPr lang="en-US" smtClean="0"/>
-              <a:t>7/29/2020</a:t>
+              <a:t>8/12/2020</a:t>
             </a:fld>
             <a:endParaRPr lang="en-US"/>
           </a:p>
@@ -3312,7 +3397,7 @@
           <a:p>
             <a:fld id="{63251C4F-8DAA-445A-9204-38B149BE527B}" type="datetime1">
               <a:rPr lang="en-US" smtClean="0"/>
-              <a:t>7/29/2020</a:t>
+              <a:t>8/12/2020</a:t>
             </a:fld>
             <a:endParaRPr lang="en-US"/>
           </a:p>
@@ -3556,7 +3641,7 @@
           <a:p>
             <a:fld id="{9C53D9E6-3555-485D-B762-D68C9D979839}" type="datetime1">
               <a:rPr lang="en-US" smtClean="0"/>
-              <a:t>7/29/2020</a:t>
+              <a:t>8/12/2020</a:t>
             </a:fld>
             <a:endParaRPr lang="en-US"/>
           </a:p>
@@ -4165,6 +4250,206 @@
           <a:p>
             <a:pPr algn="ctr"/>
             <a:r>
+              <a:rPr lang="en-US" kern="1200">
+                <a:solidFill>
+                  <a:schemeClr val="tx1"/>
+                </a:solidFill>
+                <a:latin typeface="+mj-lt"/>
+                <a:ea typeface="+mj-ea"/>
+                <a:cs typeface="+mj-cs"/>
+              </a:rPr>
+              <a:t>Shadowing</a:t>
+            </a:r>
+            <a:endParaRPr lang="en-US" kern="1200" dirty="0">
+              <a:solidFill>
+                <a:schemeClr val="tx1"/>
+              </a:solidFill>
+              <a:latin typeface="+mj-lt"/>
+              <a:ea typeface="+mj-ea"/>
+              <a:cs typeface="+mj-cs"/>
+            </a:endParaRPr>
+          </a:p>
+        </p:txBody>
+      </p:sp>
+      <p:pic>
+        <p:nvPicPr>
+          <p:cNvPr id="5" name="Picture 4" descr="A screenshot of a cell phone&#10;&#10;Description automatically generated">
+            <a:extLst>
+              <a:ext uri="{FF2B5EF4-FFF2-40B4-BE49-F238E27FC236}">
+                <a16:creationId xmlns:a16="http://schemas.microsoft.com/office/drawing/2014/main" id="{36860D48-756D-4CE3-BEEF-CBF2FA115799}"/>
+              </a:ext>
+            </a:extLst>
+          </p:cNvPr>
+          <p:cNvPicPr>
+            <a:picLocks noChangeAspect="1"/>
+          </p:cNvPicPr>
+          <p:nvPr/>
+        </p:nvPicPr>
+        <p:blipFill>
+          <a:blip r:embed="rId2">
+            <a:extLst>
+              <a:ext uri="{28A0092B-C50C-407E-A947-70E740481C1C}">
+                <a14:useLocalDpi xmlns:a14="http://schemas.microsoft.com/office/drawing/2010/main" val="0"/>
+              </a:ext>
+            </a:extLst>
+          </a:blip>
+          <a:stretch>
+            <a:fillRect/>
+          </a:stretch>
+        </p:blipFill>
+        <p:spPr>
+          <a:xfrm>
+            <a:off x="828675" y="2106773"/>
+            <a:ext cx="10525125" cy="3789043"/>
+          </a:xfrm>
+          <a:prstGeom prst="rect">
+            <a:avLst/>
+          </a:prstGeom>
+        </p:spPr>
+      </p:pic>
+      <p:sp>
+        <p:nvSpPr>
+          <p:cNvPr id="4" name="Footer Placeholder 3">
+            <a:extLst>
+              <a:ext uri="{FF2B5EF4-FFF2-40B4-BE49-F238E27FC236}">
+                <a16:creationId xmlns:a16="http://schemas.microsoft.com/office/drawing/2014/main" id="{983E1BA2-D9FD-41BC-AC0D-55687EE8BF9E}"/>
+              </a:ext>
+            </a:extLst>
+          </p:cNvPr>
+          <p:cNvSpPr>
+            <a:spLocks noGrp="1"/>
+          </p:cNvSpPr>
+          <p:nvPr>
+            <p:ph type="ftr" sz="quarter" idx="11"/>
+          </p:nvPr>
+        </p:nvSpPr>
+        <p:spPr>
+          <a:xfrm>
+            <a:off x="4033837" y="1411125"/>
+            <a:ext cx="4114800" cy="365125"/>
+          </a:xfrm>
+        </p:spPr>
+        <p:txBody>
+          <a:bodyPr vert="horz" lIns="91440" tIns="45720" rIns="91440" bIns="45720" rtlCol="0" anchor="ctr">
+            <a:normAutofit/>
+          </a:bodyPr>
+          <a:lstStyle/>
+          <a:p>
+            <a:pPr>
+              <a:lnSpc>
+                <a:spcPct val="90000"/>
+              </a:lnSpc>
+              <a:spcAft>
+                <a:spcPts val="600"/>
+              </a:spcAft>
+            </a:pPr>
+            <a:r>
+              <a:rPr lang="en-US" sz="1000" kern="1200" dirty="0">
+                <a:solidFill>
+                  <a:schemeClr val="tx1">
+                    <a:tint val="75000"/>
+                  </a:schemeClr>
+                </a:solidFill>
+                <a:latin typeface="+mn-lt"/>
+                <a:ea typeface="+mn-ea"/>
+                <a:cs typeface="+mn-cs"/>
+                <a:hlinkClick r:id="rId3"/>
+              </a:rPr>
+              <a:t> https://doc.rust-lang.org/book/ch03-01-variables-and-mutability.html</a:t>
+            </a:r>
+            <a:endParaRPr lang="en-US" sz="1000" kern="1200" dirty="0">
+              <a:solidFill>
+                <a:schemeClr val="tx1">
+                  <a:tint val="75000"/>
+                </a:schemeClr>
+              </a:solidFill>
+              <a:latin typeface="+mn-lt"/>
+              <a:ea typeface="+mn-ea"/>
+              <a:cs typeface="+mn-cs"/>
+            </a:endParaRPr>
+          </a:p>
+        </p:txBody>
+      </p:sp>
+    </p:spTree>
+    <p:extLst>
+      <p:ext uri="{BB962C8B-B14F-4D97-AF65-F5344CB8AC3E}">
+        <p14:creationId xmlns:p14="http://schemas.microsoft.com/office/powerpoint/2010/main" val="3758640645"/>
+      </p:ext>
+    </p:extLst>
+  </p:cSld>
+  <p:clrMapOvr>
+    <a:masterClrMapping/>
+  </p:clrMapOvr>
+  <mc:AlternateContent xmlns:mc="http://schemas.openxmlformats.org/markup-compatibility/2006" xmlns:p14="http://schemas.microsoft.com/office/powerpoint/2010/main">
+    <mc:Choice Requires="p14">
+      <p:transition spd="med" p14:dur="700">
+        <p:fade/>
+      </p:transition>
+    </mc:Choice>
+    <mc:Fallback xmlns="">
+      <p:transition spd="med">
+        <p:fade/>
+      </p:transition>
+    </mc:Fallback>
+  </mc:AlternateContent>
+</p:sld>
+</file>
+
+<file path=ppt/slides/slide11.xml><?xml version="1.0" encoding="utf-8"?>
+<p:sld xmlns:a="http://schemas.openxmlformats.org/drawingml/2006/main" xmlns:r="http://schemas.openxmlformats.org/officeDocument/2006/relationships" xmlns:p="http://schemas.openxmlformats.org/presentationml/2006/main">
+  <p:cSld>
+    <p:bg>
+      <p:bgPr>
+        <a:solidFill>
+          <a:schemeClr val="bg1"/>
+        </a:solidFill>
+        <a:effectLst/>
+      </p:bgPr>
+    </p:bg>
+    <p:spTree>
+      <p:nvGrpSpPr>
+        <p:cNvPr id="1" name=""/>
+        <p:cNvGrpSpPr/>
+        <p:nvPr/>
+      </p:nvGrpSpPr>
+      <p:grpSpPr>
+        <a:xfrm>
+          <a:off x="0" y="0"/>
+          <a:ext cx="0" cy="0"/>
+          <a:chOff x="0" y="0"/>
+          <a:chExt cx="0" cy="0"/>
+        </a:xfrm>
+      </p:grpSpPr>
+      <p:sp>
+        <p:nvSpPr>
+          <p:cNvPr id="2" name="Title 1">
+            <a:extLst>
+              <a:ext uri="{FF2B5EF4-FFF2-40B4-BE49-F238E27FC236}">
+                <a16:creationId xmlns:a16="http://schemas.microsoft.com/office/drawing/2014/main" id="{E4326CFC-8929-4EAA-AACB-65A09AC72B19}"/>
+              </a:ext>
+            </a:extLst>
+          </p:cNvPr>
+          <p:cNvSpPr>
+            <a:spLocks noGrp="1"/>
+          </p:cNvSpPr>
+          <p:nvPr>
+            <p:ph type="title"/>
+          </p:nvPr>
+        </p:nvSpPr>
+        <p:spPr>
+          <a:xfrm>
+            <a:off x="838200" y="365125"/>
+            <a:ext cx="10515600" cy="1325563"/>
+          </a:xfrm>
+        </p:spPr>
+        <p:txBody>
+          <a:bodyPr vert="horz" lIns="91440" tIns="45720" rIns="91440" bIns="45720" rtlCol="0" anchor="ctr">
+            <a:normAutofit/>
+          </a:bodyPr>
+          <a:lstStyle/>
+          <a:p>
+            <a:pPr algn="ctr"/>
+            <a:r>
               <a:rPr lang="en-US" kern="1200" dirty="0">
                 <a:solidFill>
                   <a:schemeClr val="tx1"/>
@@ -4294,7 +4579,7 @@
 </p:sld>
 </file>
 
-<file path=ppt/slides/slide11.xml><?xml version="1.0" encoding="utf-8"?>
+<file path=ppt/slides/slide12.xml><?xml version="1.0" encoding="utf-8"?>
 <p:sld xmlns:a="http://schemas.openxmlformats.org/drawingml/2006/main" xmlns:r="http://schemas.openxmlformats.org/officeDocument/2006/relationships" xmlns:p="http://schemas.openxmlformats.org/presentationml/2006/main">
   <p:cSld>
     <p:bg>
@@ -8809,6 +9094,190 @@
     <p:bg>
       <p:bgPr>
         <a:solidFill>
+          <a:schemeClr val="bg1"/>
+        </a:solidFill>
+        <a:effectLst/>
+      </p:bgPr>
+    </p:bg>
+    <p:spTree>
+      <p:nvGrpSpPr>
+        <p:cNvPr id="1" name=""/>
+        <p:cNvGrpSpPr/>
+        <p:nvPr/>
+      </p:nvGrpSpPr>
+      <p:grpSpPr>
+        <a:xfrm>
+          <a:off x="0" y="0"/>
+          <a:ext cx="0" cy="0"/>
+          <a:chOff x="0" y="0"/>
+          <a:chExt cx="0" cy="0"/>
+        </a:xfrm>
+      </p:grpSpPr>
+      <p:sp>
+        <p:nvSpPr>
+          <p:cNvPr id="2" name="Title 1">
+            <a:extLst>
+              <a:ext uri="{FF2B5EF4-FFF2-40B4-BE49-F238E27FC236}">
+                <a16:creationId xmlns:a16="http://schemas.microsoft.com/office/drawing/2014/main" id="{E4326CFC-8929-4EAA-AACB-65A09AC72B19}"/>
+              </a:ext>
+            </a:extLst>
+          </p:cNvPr>
+          <p:cNvSpPr>
+            <a:spLocks noGrp="1"/>
+          </p:cNvSpPr>
+          <p:nvPr>
+            <p:ph type="title"/>
+          </p:nvPr>
+        </p:nvSpPr>
+        <p:spPr>
+          <a:xfrm>
+            <a:off x="838200" y="365125"/>
+            <a:ext cx="10515600" cy="1325563"/>
+          </a:xfrm>
+        </p:spPr>
+        <p:txBody>
+          <a:bodyPr vert="horz" lIns="91440" tIns="45720" rIns="91440" bIns="45720" rtlCol="0" anchor="ctr">
+            <a:normAutofit/>
+          </a:bodyPr>
+          <a:lstStyle/>
+          <a:p>
+            <a:pPr algn="ctr"/>
+            <a:r>
+              <a:rPr lang="en-US" kern="1200" dirty="0">
+                <a:solidFill>
+                  <a:schemeClr val="tx1"/>
+                </a:solidFill>
+                <a:latin typeface="+mj-lt"/>
+                <a:ea typeface="+mj-ea"/>
+                <a:cs typeface="+mj-cs"/>
+              </a:rPr>
+              <a:t>Ownership</a:t>
+            </a:r>
+          </a:p>
+        </p:txBody>
+      </p:sp>
+      <p:sp>
+        <p:nvSpPr>
+          <p:cNvPr id="4" name="Footer Placeholder 3">
+            <a:extLst>
+              <a:ext uri="{FF2B5EF4-FFF2-40B4-BE49-F238E27FC236}">
+                <a16:creationId xmlns:a16="http://schemas.microsoft.com/office/drawing/2014/main" id="{983E1BA2-D9FD-41BC-AC0D-55687EE8BF9E}"/>
+              </a:ext>
+            </a:extLst>
+          </p:cNvPr>
+          <p:cNvSpPr>
+            <a:spLocks noGrp="1"/>
+          </p:cNvSpPr>
+          <p:nvPr>
+            <p:ph type="ftr" sz="quarter" idx="11"/>
+          </p:nvPr>
+        </p:nvSpPr>
+        <p:spPr>
+          <a:xfrm>
+            <a:off x="4033837" y="1411125"/>
+            <a:ext cx="4114800" cy="365125"/>
+          </a:xfrm>
+        </p:spPr>
+        <p:txBody>
+          <a:bodyPr vert="horz" lIns="91440" tIns="45720" rIns="91440" bIns="45720" rtlCol="0" anchor="ctr">
+            <a:normAutofit fontScale="92500"/>
+          </a:bodyPr>
+          <a:lstStyle/>
+          <a:p>
+            <a:pPr>
+              <a:lnSpc>
+                <a:spcPct val="90000"/>
+              </a:lnSpc>
+              <a:spcAft>
+                <a:spcPts val="600"/>
+              </a:spcAft>
+            </a:pPr>
+            <a:r>
+              <a:rPr lang="en-US" sz="1200" dirty="0">
+                <a:hlinkClick r:id="rId3"/>
+              </a:rPr>
+              <a:t>https://doc.rust-lang.org/book/ch04-01-what-is-ownership.html</a:t>
+            </a:r>
+            <a:endParaRPr lang="en-US" sz="1000" kern="1200" dirty="0">
+              <a:solidFill>
+                <a:schemeClr val="tx1">
+                  <a:tint val="75000"/>
+                </a:schemeClr>
+              </a:solidFill>
+              <a:latin typeface="+mn-lt"/>
+              <a:ea typeface="+mn-ea"/>
+              <a:cs typeface="+mn-cs"/>
+            </a:endParaRPr>
+          </a:p>
+        </p:txBody>
+      </p:sp>
+      <p:pic>
+        <p:nvPicPr>
+          <p:cNvPr id="5" name="Picture 4" descr="A screenshot of a computer&#10;&#10;Description automatically generated">
+            <a:extLst>
+              <a:ext uri="{FF2B5EF4-FFF2-40B4-BE49-F238E27FC236}">
+                <a16:creationId xmlns:a16="http://schemas.microsoft.com/office/drawing/2014/main" id="{39ECE13D-33B8-4FD4-BCFE-DB5E1DFB2A82}"/>
+              </a:ext>
+            </a:extLst>
+          </p:cNvPr>
+          <p:cNvPicPr>
+            <a:picLocks noChangeAspect="1"/>
+          </p:cNvPicPr>
+          <p:nvPr/>
+        </p:nvPicPr>
+        <p:blipFill>
+          <a:blip r:embed="rId4">
+            <a:extLst>
+              <a:ext uri="{28A0092B-C50C-407E-A947-70E740481C1C}">
+                <a14:useLocalDpi xmlns:a14="http://schemas.microsoft.com/office/drawing/2010/main" val="0"/>
+              </a:ext>
+            </a:extLst>
+          </a:blip>
+          <a:stretch>
+            <a:fillRect/>
+          </a:stretch>
+        </p:blipFill>
+        <p:spPr>
+          <a:xfrm>
+            <a:off x="542150" y="1871445"/>
+            <a:ext cx="11107700" cy="3115110"/>
+          </a:xfrm>
+          <a:prstGeom prst="rect">
+            <a:avLst/>
+          </a:prstGeom>
+        </p:spPr>
+      </p:pic>
+    </p:spTree>
+    <p:extLst>
+      <p:ext uri="{BB962C8B-B14F-4D97-AF65-F5344CB8AC3E}">
+        <p14:creationId xmlns:p14="http://schemas.microsoft.com/office/powerpoint/2010/main" val="173695119"/>
+      </p:ext>
+    </p:extLst>
+  </p:cSld>
+  <p:clrMapOvr>
+    <a:masterClrMapping/>
+  </p:clrMapOvr>
+  <mc:AlternateContent xmlns:mc="http://schemas.openxmlformats.org/markup-compatibility/2006" xmlns:p14="http://schemas.microsoft.com/office/powerpoint/2010/main">
+    <mc:Choice Requires="p14">
+      <p:transition spd="med" p14:dur="700">
+        <p:fade/>
+      </p:transition>
+    </mc:Choice>
+    <mc:Fallback xmlns="">
+      <p:transition spd="med">
+        <p:fade/>
+      </p:transition>
+    </mc:Fallback>
+  </mc:AlternateContent>
+</p:sld>
+</file>
+
+<file path=ppt/slides/slide8.xml><?xml version="1.0" encoding="utf-8"?>
+<p:sld xmlns:a="http://schemas.openxmlformats.org/drawingml/2006/main" xmlns:r="http://schemas.openxmlformats.org/officeDocument/2006/relationships" xmlns:p="http://schemas.openxmlformats.org/presentationml/2006/main">
+  <p:cSld>
+    <p:bg>
+      <p:bgPr>
+        <a:solidFill>
           <a:schemeClr val="bg1">
             <a:tint val="95000"/>
             <a:satMod val="170000"/>
@@ -9372,7 +9841,7 @@
 </p:sld>
 </file>
 
-<file path=ppt/slides/slide8.xml><?xml version="1.0" encoding="utf-8"?>
+<file path=ppt/slides/slide9.xml><?xml version="1.0" encoding="utf-8"?>
 <p:sld xmlns:a="http://schemas.openxmlformats.org/drawingml/2006/main" xmlns:r="http://schemas.openxmlformats.org/officeDocument/2006/relationships" xmlns:p="http://schemas.openxmlformats.org/presentationml/2006/main">
   <p:cSld>
     <p:bg>
@@ -9585,206 +10054,6 @@
     <p:extLst>
       <p:ext uri="{BB962C8B-B14F-4D97-AF65-F5344CB8AC3E}">
         <p14:creationId xmlns:p14="http://schemas.microsoft.com/office/powerpoint/2010/main" val="985327731"/>
-      </p:ext>
-    </p:extLst>
-  </p:cSld>
-  <p:clrMapOvr>
-    <a:masterClrMapping/>
-  </p:clrMapOvr>
-  <mc:AlternateContent xmlns:mc="http://schemas.openxmlformats.org/markup-compatibility/2006" xmlns:p14="http://schemas.microsoft.com/office/powerpoint/2010/main">
-    <mc:Choice Requires="p14">
-      <p:transition spd="med" p14:dur="700">
-        <p:fade/>
-      </p:transition>
-    </mc:Choice>
-    <mc:Fallback xmlns="">
-      <p:transition spd="med">
-        <p:fade/>
-      </p:transition>
-    </mc:Fallback>
-  </mc:AlternateContent>
-</p:sld>
-</file>
-
-<file path=ppt/slides/slide9.xml><?xml version="1.0" encoding="utf-8"?>
-<p:sld xmlns:a="http://schemas.openxmlformats.org/drawingml/2006/main" xmlns:r="http://schemas.openxmlformats.org/officeDocument/2006/relationships" xmlns:p="http://schemas.openxmlformats.org/presentationml/2006/main">
-  <p:cSld>
-    <p:bg>
-      <p:bgPr>
-        <a:solidFill>
-          <a:schemeClr val="bg1"/>
-        </a:solidFill>
-        <a:effectLst/>
-      </p:bgPr>
-    </p:bg>
-    <p:spTree>
-      <p:nvGrpSpPr>
-        <p:cNvPr id="1" name=""/>
-        <p:cNvGrpSpPr/>
-        <p:nvPr/>
-      </p:nvGrpSpPr>
-      <p:grpSpPr>
-        <a:xfrm>
-          <a:off x="0" y="0"/>
-          <a:ext cx="0" cy="0"/>
-          <a:chOff x="0" y="0"/>
-          <a:chExt cx="0" cy="0"/>
-        </a:xfrm>
-      </p:grpSpPr>
-      <p:sp>
-        <p:nvSpPr>
-          <p:cNvPr id="2" name="Title 1">
-            <a:extLst>
-              <a:ext uri="{FF2B5EF4-FFF2-40B4-BE49-F238E27FC236}">
-                <a16:creationId xmlns:a16="http://schemas.microsoft.com/office/drawing/2014/main" id="{E4326CFC-8929-4EAA-AACB-65A09AC72B19}"/>
-              </a:ext>
-            </a:extLst>
-          </p:cNvPr>
-          <p:cNvSpPr>
-            <a:spLocks noGrp="1"/>
-          </p:cNvSpPr>
-          <p:nvPr>
-            <p:ph type="title"/>
-          </p:nvPr>
-        </p:nvSpPr>
-        <p:spPr>
-          <a:xfrm>
-            <a:off x="838200" y="365125"/>
-            <a:ext cx="10515600" cy="1325563"/>
-          </a:xfrm>
-        </p:spPr>
-        <p:txBody>
-          <a:bodyPr vert="horz" lIns="91440" tIns="45720" rIns="91440" bIns="45720" rtlCol="0" anchor="ctr">
-            <a:normAutofit/>
-          </a:bodyPr>
-          <a:lstStyle/>
-          <a:p>
-            <a:pPr algn="ctr"/>
-            <a:r>
-              <a:rPr lang="en-US" kern="1200">
-                <a:solidFill>
-                  <a:schemeClr val="tx1"/>
-                </a:solidFill>
-                <a:latin typeface="+mj-lt"/>
-                <a:ea typeface="+mj-ea"/>
-                <a:cs typeface="+mj-cs"/>
-              </a:rPr>
-              <a:t>Shadowing</a:t>
-            </a:r>
-            <a:endParaRPr lang="en-US" kern="1200" dirty="0">
-              <a:solidFill>
-                <a:schemeClr val="tx1"/>
-              </a:solidFill>
-              <a:latin typeface="+mj-lt"/>
-              <a:ea typeface="+mj-ea"/>
-              <a:cs typeface="+mj-cs"/>
-            </a:endParaRPr>
-          </a:p>
-        </p:txBody>
-      </p:sp>
-      <p:pic>
-        <p:nvPicPr>
-          <p:cNvPr id="5" name="Picture 4" descr="A screenshot of a cell phone&#10;&#10;Description automatically generated">
-            <a:extLst>
-              <a:ext uri="{FF2B5EF4-FFF2-40B4-BE49-F238E27FC236}">
-                <a16:creationId xmlns:a16="http://schemas.microsoft.com/office/drawing/2014/main" id="{36860D48-756D-4CE3-BEEF-CBF2FA115799}"/>
-              </a:ext>
-            </a:extLst>
-          </p:cNvPr>
-          <p:cNvPicPr>
-            <a:picLocks noChangeAspect="1"/>
-          </p:cNvPicPr>
-          <p:nvPr/>
-        </p:nvPicPr>
-        <p:blipFill>
-          <a:blip r:embed="rId2">
-            <a:extLst>
-              <a:ext uri="{28A0092B-C50C-407E-A947-70E740481C1C}">
-                <a14:useLocalDpi xmlns:a14="http://schemas.microsoft.com/office/drawing/2010/main" val="0"/>
-              </a:ext>
-            </a:extLst>
-          </a:blip>
-          <a:stretch>
-            <a:fillRect/>
-          </a:stretch>
-        </p:blipFill>
-        <p:spPr>
-          <a:xfrm>
-            <a:off x="828675" y="2106773"/>
-            <a:ext cx="10525125" cy="3789043"/>
-          </a:xfrm>
-          <a:prstGeom prst="rect">
-            <a:avLst/>
-          </a:prstGeom>
-        </p:spPr>
-      </p:pic>
-      <p:sp>
-        <p:nvSpPr>
-          <p:cNvPr id="4" name="Footer Placeholder 3">
-            <a:extLst>
-              <a:ext uri="{FF2B5EF4-FFF2-40B4-BE49-F238E27FC236}">
-                <a16:creationId xmlns:a16="http://schemas.microsoft.com/office/drawing/2014/main" id="{983E1BA2-D9FD-41BC-AC0D-55687EE8BF9E}"/>
-              </a:ext>
-            </a:extLst>
-          </p:cNvPr>
-          <p:cNvSpPr>
-            <a:spLocks noGrp="1"/>
-          </p:cNvSpPr>
-          <p:nvPr>
-            <p:ph type="ftr" sz="quarter" idx="11"/>
-          </p:nvPr>
-        </p:nvSpPr>
-        <p:spPr>
-          <a:xfrm>
-            <a:off x="4033837" y="1411125"/>
-            <a:ext cx="4114800" cy="365125"/>
-          </a:xfrm>
-        </p:spPr>
-        <p:txBody>
-          <a:bodyPr vert="horz" lIns="91440" tIns="45720" rIns="91440" bIns="45720" rtlCol="0" anchor="ctr">
-            <a:normAutofit/>
-          </a:bodyPr>
-          <a:lstStyle/>
-          <a:p>
-            <a:pPr>
-              <a:lnSpc>
-                <a:spcPct val="90000"/>
-              </a:lnSpc>
-              <a:spcAft>
-                <a:spcPts val="600"/>
-              </a:spcAft>
-            </a:pPr>
-            <a:r>
-              <a:rPr lang="en-US" sz="1000" kern="1200" dirty="0">
-                <a:solidFill>
-                  <a:schemeClr val="tx1">
-                    <a:tint val="75000"/>
-                  </a:schemeClr>
-                </a:solidFill>
-                <a:latin typeface="+mn-lt"/>
-                <a:ea typeface="+mn-ea"/>
-                <a:cs typeface="+mn-cs"/>
-                <a:hlinkClick r:id="rId3"/>
-              </a:rPr>
-              <a:t> https://doc.rust-lang.org/book/ch03-01-variables-and-mutability.html</a:t>
-            </a:r>
-            <a:endParaRPr lang="en-US" sz="1000" kern="1200" dirty="0">
-              <a:solidFill>
-                <a:schemeClr val="tx1">
-                  <a:tint val="75000"/>
-                </a:schemeClr>
-              </a:solidFill>
-              <a:latin typeface="+mn-lt"/>
-              <a:ea typeface="+mn-ea"/>
-              <a:cs typeface="+mn-cs"/>
-            </a:endParaRPr>
-          </a:p>
-        </p:txBody>
-      </p:sp>
-    </p:spTree>
-    <p:extLst>
-      <p:ext uri="{BB962C8B-B14F-4D97-AF65-F5344CB8AC3E}">
-        <p14:creationId xmlns:p14="http://schemas.microsoft.com/office/powerpoint/2010/main" val="3758640645"/>
       </p:ext>
     </p:extLst>
   </p:cSld>

</xml_diff>

<commit_message>
updated ppt and added more ownership graphics
</commit_message>
<xml_diff>
--- a/RustIntro.pptx
+++ b/RustIntro.pptx
@@ -5,21 +5,20 @@
     <p:sldMasterId id="2147483648" r:id="rId1"/>
   </p:sldMasterIdLst>
   <p:notesMasterIdLst>
-    <p:notesMasterId r:id="rId14"/>
+    <p:notesMasterId r:id="rId13"/>
   </p:notesMasterIdLst>
   <p:sldIdLst>
-    <p:sldId id="256" r:id="rId2"/>
-    <p:sldId id="265" r:id="rId3"/>
-    <p:sldId id="257" r:id="rId4"/>
-    <p:sldId id="260" r:id="rId5"/>
-    <p:sldId id="258" r:id="rId6"/>
-    <p:sldId id="259" r:id="rId7"/>
-    <p:sldId id="267" r:id="rId8"/>
-    <p:sldId id="264" r:id="rId9"/>
-    <p:sldId id="262" r:id="rId10"/>
-    <p:sldId id="263" r:id="rId11"/>
-    <p:sldId id="266" r:id="rId12"/>
-    <p:sldId id="261" r:id="rId13"/>
+    <p:sldId id="265" r:id="rId2"/>
+    <p:sldId id="257" r:id="rId3"/>
+    <p:sldId id="260" r:id="rId4"/>
+    <p:sldId id="258" r:id="rId5"/>
+    <p:sldId id="259" r:id="rId6"/>
+    <p:sldId id="267" r:id="rId7"/>
+    <p:sldId id="264" r:id="rId8"/>
+    <p:sldId id="262" r:id="rId9"/>
+    <p:sldId id="263" r:id="rId10"/>
+    <p:sldId id="266" r:id="rId11"/>
+    <p:sldId id="261" r:id="rId12"/>
   </p:sldIdLst>
   <p:sldSz cx="12192000" cy="6858000"/>
   <p:notesSz cx="6858000" cy="9144000"/>
@@ -208,7 +207,7 @@
           <a:p>
             <a:fld id="{F5D7967C-BE0C-4865-9A87-53F83D2C2106}" type="datetimeFigureOut">
               <a:rPr lang="en-US" smtClean="0"/>
-              <a:t>8/12/2020</a:t>
+              <a:t>8/19/2020</a:t>
             </a:fld>
             <a:endParaRPr lang="en-US"/>
           </a:p>
@@ -549,7 +548,7 @@
     </p:spTree>
     <p:extLst>
       <p:ext uri="{BB962C8B-B14F-4D97-AF65-F5344CB8AC3E}">
-        <p14:creationId xmlns:p14="http://schemas.microsoft.com/office/powerpoint/2010/main" val="4129619427"/>
+        <p14:creationId xmlns:p14="http://schemas.microsoft.com/office/powerpoint/2010/main" val="714806315"/>
       </p:ext>
     </p:extLst>
   </p:cSld>
@@ -624,7 +623,7 @@
           <a:p>
             <a:fld id="{B891341A-8AB9-4FB5-850B-4CBCD13A163C}" type="slidenum">
               <a:rPr lang="en-US" smtClean="0"/>
-              <a:t>2</a:t>
+              <a:t>6</a:t>
             </a:fld>
             <a:endParaRPr lang="en-US"/>
           </a:p>
@@ -633,7 +632,7 @@
     </p:spTree>
     <p:extLst>
       <p:ext uri="{BB962C8B-B14F-4D97-AF65-F5344CB8AC3E}">
-        <p14:creationId xmlns:p14="http://schemas.microsoft.com/office/powerpoint/2010/main" val="714806315"/>
+        <p14:creationId xmlns:p14="http://schemas.microsoft.com/office/powerpoint/2010/main" val="979753538"/>
       </p:ext>
     </p:extLst>
   </p:cSld>
@@ -708,91 +707,7 @@
           <a:p>
             <a:fld id="{B891341A-8AB9-4FB5-850B-4CBCD13A163C}" type="slidenum">
               <a:rPr lang="en-US" smtClean="0"/>
-              <a:t>7</a:t>
-            </a:fld>
-            <a:endParaRPr lang="en-US"/>
-          </a:p>
-        </p:txBody>
-      </p:sp>
-    </p:spTree>
-    <p:extLst>
-      <p:ext uri="{BB962C8B-B14F-4D97-AF65-F5344CB8AC3E}">
-        <p14:creationId xmlns:p14="http://schemas.microsoft.com/office/powerpoint/2010/main" val="979753538"/>
-      </p:ext>
-    </p:extLst>
-  </p:cSld>
-  <p:clrMapOvr>
-    <a:masterClrMapping/>
-  </p:clrMapOvr>
-</p:notes>
-</file>
-
-<file path=ppt/notesSlides/notesSlide4.xml><?xml version="1.0" encoding="utf-8"?>
-<p:notes xmlns:a="http://schemas.openxmlformats.org/drawingml/2006/main" xmlns:r="http://schemas.openxmlformats.org/officeDocument/2006/relationships" xmlns:p="http://schemas.openxmlformats.org/presentationml/2006/main">
-  <p:cSld>
-    <p:spTree>
-      <p:nvGrpSpPr>
-        <p:cNvPr id="1" name=""/>
-        <p:cNvGrpSpPr/>
-        <p:nvPr/>
-      </p:nvGrpSpPr>
-      <p:grpSpPr>
-        <a:xfrm>
-          <a:off x="0" y="0"/>
-          <a:ext cx="0" cy="0"/>
-          <a:chOff x="0" y="0"/>
-          <a:chExt cx="0" cy="0"/>
-        </a:xfrm>
-      </p:grpSpPr>
-      <p:sp>
-        <p:nvSpPr>
-          <p:cNvPr id="2" name="Slide Image Placeholder 1"/>
-          <p:cNvSpPr>
-            <a:spLocks noGrp="1" noRot="1" noChangeAspect="1"/>
-          </p:cNvSpPr>
-          <p:nvPr>
-            <p:ph type="sldImg"/>
-          </p:nvPr>
-        </p:nvSpPr>
-        <p:spPr/>
-      </p:sp>
-      <p:sp>
-        <p:nvSpPr>
-          <p:cNvPr id="3" name="Notes Placeholder 2"/>
-          <p:cNvSpPr>
-            <a:spLocks noGrp="1"/>
-          </p:cNvSpPr>
-          <p:nvPr>
-            <p:ph type="body" idx="1"/>
-          </p:nvPr>
-        </p:nvSpPr>
-        <p:spPr/>
-        <p:txBody>
-          <a:bodyPr/>
-          <a:lstStyle/>
-          <a:p>
-            <a:endParaRPr lang="en-US" dirty="0"/>
-          </a:p>
-        </p:txBody>
-      </p:sp>
-      <p:sp>
-        <p:nvSpPr>
-          <p:cNvPr id="4" name="Slide Number Placeholder 3"/>
-          <p:cNvSpPr>
-            <a:spLocks noGrp="1"/>
-          </p:cNvSpPr>
-          <p:nvPr>
-            <p:ph type="sldNum" sz="quarter" idx="5"/>
-          </p:nvPr>
-        </p:nvSpPr>
-        <p:spPr/>
-        <p:txBody>
-          <a:bodyPr/>
-          <a:lstStyle/>
-          <a:p>
-            <a:fld id="{B891341A-8AB9-4FB5-850B-4CBCD13A163C}" type="slidenum">
-              <a:rPr lang="en-US" smtClean="0"/>
-              <a:t>12</a:t>
+              <a:t>11</a:t>
             </a:fld>
             <a:endParaRPr lang="en-US"/>
           </a:p>
@@ -958,7 +873,7 @@
           <a:p>
             <a:fld id="{2BE63B19-0516-4569-B712-8EC5C5FC73D7}" type="datetime1">
               <a:rPr lang="en-US" smtClean="0"/>
-              <a:t>8/12/2020</a:t>
+              <a:t>8/19/2020</a:t>
             </a:fld>
             <a:endParaRPr lang="en-US"/>
           </a:p>
@@ -1159,7 +1074,7 @@
           <a:p>
             <a:fld id="{43868FD8-0AD7-4E1F-9181-3C53BA169C86}" type="datetime1">
               <a:rPr lang="en-US" smtClean="0"/>
-              <a:t>8/12/2020</a:t>
+              <a:t>8/19/2020</a:t>
             </a:fld>
             <a:endParaRPr lang="en-US"/>
           </a:p>
@@ -1370,7 +1285,7 @@
           <a:p>
             <a:fld id="{8ABE26B9-926F-4C00-8E0D-BB88A26F3D37}" type="datetime1">
               <a:rPr lang="en-US" smtClean="0"/>
-              <a:t>8/12/2020</a:t>
+              <a:t>8/19/2020</a:t>
             </a:fld>
             <a:endParaRPr lang="en-US"/>
           </a:p>
@@ -1571,7 +1486,7 @@
           <a:p>
             <a:fld id="{36AE9653-09A4-4A1A-86A2-22EA13F9AAFB}" type="datetime1">
               <a:rPr lang="en-US" smtClean="0"/>
-              <a:t>8/12/2020</a:t>
+              <a:t>8/19/2020</a:t>
             </a:fld>
             <a:endParaRPr lang="en-US"/>
           </a:p>
@@ -1849,7 +1764,7 @@
           <a:p>
             <a:fld id="{FCC1FEA8-435A-48E4-9E4C-E82C791266DE}" type="datetime1">
               <a:rPr lang="en-US" smtClean="0"/>
-              <a:t>8/12/2020</a:t>
+              <a:t>8/19/2020</a:t>
             </a:fld>
             <a:endParaRPr lang="en-US"/>
           </a:p>
@@ -2117,7 +2032,7 @@
           <a:p>
             <a:fld id="{9769E967-A411-4969-B358-58EEDD1723EE}" type="datetime1">
               <a:rPr lang="en-US" smtClean="0"/>
-              <a:t>8/12/2020</a:t>
+              <a:t>8/19/2020</a:t>
             </a:fld>
             <a:endParaRPr lang="en-US"/>
           </a:p>
@@ -2532,7 +2447,7 @@
           <a:p>
             <a:fld id="{26CF9157-5643-4813-B559-CF3A43EAA586}" type="datetime1">
               <a:rPr lang="en-US" smtClean="0"/>
-              <a:t>8/12/2020</a:t>
+              <a:t>8/19/2020</a:t>
             </a:fld>
             <a:endParaRPr lang="en-US"/>
           </a:p>
@@ -2676,7 +2591,7 @@
           <a:p>
             <a:fld id="{E5091FD3-9EDF-4236-9615-03497DEC2F25}" type="datetime1">
               <a:rPr lang="en-US" smtClean="0"/>
-              <a:t>8/12/2020</a:t>
+              <a:t>8/19/2020</a:t>
             </a:fld>
             <a:endParaRPr lang="en-US"/>
           </a:p>
@@ -2792,7 +2707,7 @@
           <a:p>
             <a:fld id="{FD6AEB59-C6D9-473C-94BA-47DA9C5809A3}" type="datetime1">
               <a:rPr lang="en-US" smtClean="0"/>
-              <a:t>8/12/2020</a:t>
+              <a:t>8/19/2020</a:t>
             </a:fld>
             <a:endParaRPr lang="en-US"/>
           </a:p>
@@ -3106,7 +3021,7 @@
           <a:p>
             <a:fld id="{9FFF7D38-572C-4D10-80C7-509477EF5803}" type="datetime1">
               <a:rPr lang="en-US" smtClean="0"/>
-              <a:t>8/12/2020</a:t>
+              <a:t>8/19/2020</a:t>
             </a:fld>
             <a:endParaRPr lang="en-US"/>
           </a:p>
@@ -3397,7 +3312,7 @@
           <a:p>
             <a:fld id="{63251C4F-8DAA-445A-9204-38B149BE527B}" type="datetime1">
               <a:rPr lang="en-US" smtClean="0"/>
-              <a:t>8/12/2020</a:t>
+              <a:t>8/19/2020</a:t>
             </a:fld>
             <a:endParaRPr lang="en-US"/>
           </a:p>
@@ -3641,7 +3556,7 @@
           <a:p>
             <a:fld id="{9C53D9E6-3555-485D-B762-D68C9D979839}" type="datetime1">
               <a:rPr lang="en-US" smtClean="0"/>
-              <a:t>8/12/2020</a:t>
+              <a:t>8/19/2020</a:t>
             </a:fld>
             <a:endParaRPr lang="en-US"/>
           </a:p>
@@ -4177,7 +4092,42 @@
           <a:p>
             <a:r>
               <a:rPr lang="en-US" dirty="0"/>
-              <a:t>Last Updated: 07/10/2020</a:t>
+              <a:t>Last Updated: 08/19/2020</a:t>
+            </a:r>
+          </a:p>
+        </p:txBody>
+      </p:sp>
+      <p:sp>
+        <p:nvSpPr>
+          <p:cNvPr id="4" name="TextBox 3">
+            <a:extLst>
+              <a:ext uri="{FF2B5EF4-FFF2-40B4-BE49-F238E27FC236}">
+                <a16:creationId xmlns:a16="http://schemas.microsoft.com/office/drawing/2014/main" id="{BCFD7BD8-C661-4B7D-8A44-B4965523248C}"/>
+              </a:ext>
+            </a:extLst>
+          </p:cNvPr>
+          <p:cNvSpPr txBox="1"/>
+          <p:nvPr/>
+        </p:nvSpPr>
+        <p:spPr>
+          <a:xfrm flipH="1">
+            <a:off x="6096000" y="5117219"/>
+            <a:ext cx="2027853" cy="369332"/>
+          </a:xfrm>
+          <a:prstGeom prst="rect">
+            <a:avLst/>
+          </a:prstGeom>
+          <a:noFill/>
+        </p:spPr>
+        <p:txBody>
+          <a:bodyPr wrap="square" rtlCol="0">
+            <a:spAutoFit/>
+          </a:bodyPr>
+          <a:lstStyle/>
+          <a:p>
+            <a:r>
+              <a:rPr lang="en-US" dirty="0"/>
+              <a:t>Part 1: Introduction</a:t>
             </a:r>
           </a:p>
         </p:txBody>
@@ -4185,7 +4135,7 @@
     </p:spTree>
     <p:extLst>
       <p:ext uri="{BB962C8B-B14F-4D97-AF65-F5344CB8AC3E}">
-        <p14:creationId xmlns:p14="http://schemas.microsoft.com/office/powerpoint/2010/main" val="1523193237"/>
+        <p14:creationId xmlns:p14="http://schemas.microsoft.com/office/powerpoint/2010/main" val="3369542898"/>
       </p:ext>
     </p:extLst>
   </p:cSld>
@@ -4196,206 +4146,6 @@
 </file>
 
 <file path=ppt/slides/slide10.xml><?xml version="1.0" encoding="utf-8"?>
-<p:sld xmlns:a="http://schemas.openxmlformats.org/drawingml/2006/main" xmlns:r="http://schemas.openxmlformats.org/officeDocument/2006/relationships" xmlns:p="http://schemas.openxmlformats.org/presentationml/2006/main">
-  <p:cSld>
-    <p:bg>
-      <p:bgPr>
-        <a:solidFill>
-          <a:schemeClr val="bg1"/>
-        </a:solidFill>
-        <a:effectLst/>
-      </p:bgPr>
-    </p:bg>
-    <p:spTree>
-      <p:nvGrpSpPr>
-        <p:cNvPr id="1" name=""/>
-        <p:cNvGrpSpPr/>
-        <p:nvPr/>
-      </p:nvGrpSpPr>
-      <p:grpSpPr>
-        <a:xfrm>
-          <a:off x="0" y="0"/>
-          <a:ext cx="0" cy="0"/>
-          <a:chOff x="0" y="0"/>
-          <a:chExt cx="0" cy="0"/>
-        </a:xfrm>
-      </p:grpSpPr>
-      <p:sp>
-        <p:nvSpPr>
-          <p:cNvPr id="2" name="Title 1">
-            <a:extLst>
-              <a:ext uri="{FF2B5EF4-FFF2-40B4-BE49-F238E27FC236}">
-                <a16:creationId xmlns:a16="http://schemas.microsoft.com/office/drawing/2014/main" id="{E4326CFC-8929-4EAA-AACB-65A09AC72B19}"/>
-              </a:ext>
-            </a:extLst>
-          </p:cNvPr>
-          <p:cNvSpPr>
-            <a:spLocks noGrp="1"/>
-          </p:cNvSpPr>
-          <p:nvPr>
-            <p:ph type="title"/>
-          </p:nvPr>
-        </p:nvSpPr>
-        <p:spPr>
-          <a:xfrm>
-            <a:off x="838200" y="365125"/>
-            <a:ext cx="10515600" cy="1325563"/>
-          </a:xfrm>
-        </p:spPr>
-        <p:txBody>
-          <a:bodyPr vert="horz" lIns="91440" tIns="45720" rIns="91440" bIns="45720" rtlCol="0" anchor="ctr">
-            <a:normAutofit/>
-          </a:bodyPr>
-          <a:lstStyle/>
-          <a:p>
-            <a:pPr algn="ctr"/>
-            <a:r>
-              <a:rPr lang="en-US" kern="1200">
-                <a:solidFill>
-                  <a:schemeClr val="tx1"/>
-                </a:solidFill>
-                <a:latin typeface="+mj-lt"/>
-                <a:ea typeface="+mj-ea"/>
-                <a:cs typeface="+mj-cs"/>
-              </a:rPr>
-              <a:t>Shadowing</a:t>
-            </a:r>
-            <a:endParaRPr lang="en-US" kern="1200" dirty="0">
-              <a:solidFill>
-                <a:schemeClr val="tx1"/>
-              </a:solidFill>
-              <a:latin typeface="+mj-lt"/>
-              <a:ea typeface="+mj-ea"/>
-              <a:cs typeface="+mj-cs"/>
-            </a:endParaRPr>
-          </a:p>
-        </p:txBody>
-      </p:sp>
-      <p:pic>
-        <p:nvPicPr>
-          <p:cNvPr id="5" name="Picture 4" descr="A screenshot of a cell phone&#10;&#10;Description automatically generated">
-            <a:extLst>
-              <a:ext uri="{FF2B5EF4-FFF2-40B4-BE49-F238E27FC236}">
-                <a16:creationId xmlns:a16="http://schemas.microsoft.com/office/drawing/2014/main" id="{36860D48-756D-4CE3-BEEF-CBF2FA115799}"/>
-              </a:ext>
-            </a:extLst>
-          </p:cNvPr>
-          <p:cNvPicPr>
-            <a:picLocks noChangeAspect="1"/>
-          </p:cNvPicPr>
-          <p:nvPr/>
-        </p:nvPicPr>
-        <p:blipFill>
-          <a:blip r:embed="rId2">
-            <a:extLst>
-              <a:ext uri="{28A0092B-C50C-407E-A947-70E740481C1C}">
-                <a14:useLocalDpi xmlns:a14="http://schemas.microsoft.com/office/drawing/2010/main" val="0"/>
-              </a:ext>
-            </a:extLst>
-          </a:blip>
-          <a:stretch>
-            <a:fillRect/>
-          </a:stretch>
-        </p:blipFill>
-        <p:spPr>
-          <a:xfrm>
-            <a:off x="828675" y="2106773"/>
-            <a:ext cx="10525125" cy="3789043"/>
-          </a:xfrm>
-          <a:prstGeom prst="rect">
-            <a:avLst/>
-          </a:prstGeom>
-        </p:spPr>
-      </p:pic>
-      <p:sp>
-        <p:nvSpPr>
-          <p:cNvPr id="4" name="Footer Placeholder 3">
-            <a:extLst>
-              <a:ext uri="{FF2B5EF4-FFF2-40B4-BE49-F238E27FC236}">
-                <a16:creationId xmlns:a16="http://schemas.microsoft.com/office/drawing/2014/main" id="{983E1BA2-D9FD-41BC-AC0D-55687EE8BF9E}"/>
-              </a:ext>
-            </a:extLst>
-          </p:cNvPr>
-          <p:cNvSpPr>
-            <a:spLocks noGrp="1"/>
-          </p:cNvSpPr>
-          <p:nvPr>
-            <p:ph type="ftr" sz="quarter" idx="11"/>
-          </p:nvPr>
-        </p:nvSpPr>
-        <p:spPr>
-          <a:xfrm>
-            <a:off x="4033837" y="1411125"/>
-            <a:ext cx="4114800" cy="365125"/>
-          </a:xfrm>
-        </p:spPr>
-        <p:txBody>
-          <a:bodyPr vert="horz" lIns="91440" tIns="45720" rIns="91440" bIns="45720" rtlCol="0" anchor="ctr">
-            <a:normAutofit/>
-          </a:bodyPr>
-          <a:lstStyle/>
-          <a:p>
-            <a:pPr>
-              <a:lnSpc>
-                <a:spcPct val="90000"/>
-              </a:lnSpc>
-              <a:spcAft>
-                <a:spcPts val="600"/>
-              </a:spcAft>
-            </a:pPr>
-            <a:r>
-              <a:rPr lang="en-US" sz="1000" kern="1200" dirty="0">
-                <a:solidFill>
-                  <a:schemeClr val="tx1">
-                    <a:tint val="75000"/>
-                  </a:schemeClr>
-                </a:solidFill>
-                <a:latin typeface="+mn-lt"/>
-                <a:ea typeface="+mn-ea"/>
-                <a:cs typeface="+mn-cs"/>
-                <a:hlinkClick r:id="rId3"/>
-              </a:rPr>
-              <a:t> https://doc.rust-lang.org/book/ch03-01-variables-and-mutability.html</a:t>
-            </a:r>
-            <a:endParaRPr lang="en-US" sz="1000" kern="1200" dirty="0">
-              <a:solidFill>
-                <a:schemeClr val="tx1">
-                  <a:tint val="75000"/>
-                </a:schemeClr>
-              </a:solidFill>
-              <a:latin typeface="+mn-lt"/>
-              <a:ea typeface="+mn-ea"/>
-              <a:cs typeface="+mn-cs"/>
-            </a:endParaRPr>
-          </a:p>
-        </p:txBody>
-      </p:sp>
-    </p:spTree>
-    <p:extLst>
-      <p:ext uri="{BB962C8B-B14F-4D97-AF65-F5344CB8AC3E}">
-        <p14:creationId xmlns:p14="http://schemas.microsoft.com/office/powerpoint/2010/main" val="3758640645"/>
-      </p:ext>
-    </p:extLst>
-  </p:cSld>
-  <p:clrMapOvr>
-    <a:masterClrMapping/>
-  </p:clrMapOvr>
-  <mc:AlternateContent xmlns:mc="http://schemas.openxmlformats.org/markup-compatibility/2006" xmlns:p14="http://schemas.microsoft.com/office/powerpoint/2010/main">
-    <mc:Choice Requires="p14">
-      <p:transition spd="med" p14:dur="700">
-        <p:fade/>
-      </p:transition>
-    </mc:Choice>
-    <mc:Fallback xmlns="">
-      <p:transition spd="med">
-        <p:fade/>
-      </p:transition>
-    </mc:Fallback>
-  </mc:AlternateContent>
-</p:sld>
-</file>
-
-<file path=ppt/slides/slide11.xml><?xml version="1.0" encoding="utf-8"?>
 <p:sld xmlns:a="http://schemas.openxmlformats.org/drawingml/2006/main" xmlns:r="http://schemas.openxmlformats.org/officeDocument/2006/relationships" xmlns:p="http://schemas.openxmlformats.org/presentationml/2006/main">
   <p:cSld>
     <p:bg>
@@ -4579,7 +4329,7 @@
 </p:sld>
 </file>
 
-<file path=ppt/slides/slide12.xml><?xml version="1.0" encoding="utf-8"?>
+<file path=ppt/slides/slide11.xml><?xml version="1.0" encoding="utf-8"?>
 <p:sld xmlns:a="http://schemas.openxmlformats.org/drawingml/2006/main" xmlns:r="http://schemas.openxmlformats.org/officeDocument/2006/relationships" xmlns:p="http://schemas.openxmlformats.org/presentationml/2006/main">
   <p:cSld>
     <p:bg>
@@ -5586,156 +5336,6 @@
 <file path=ppt/slides/slide2.xml><?xml version="1.0" encoding="utf-8"?>
 <p:sld xmlns:a="http://schemas.openxmlformats.org/drawingml/2006/main" xmlns:r="http://schemas.openxmlformats.org/officeDocument/2006/relationships" xmlns:p="http://schemas.openxmlformats.org/presentationml/2006/main">
   <p:cSld>
-    <p:spTree>
-      <p:nvGrpSpPr>
-        <p:cNvPr id="1" name=""/>
-        <p:cNvGrpSpPr/>
-        <p:nvPr/>
-      </p:nvGrpSpPr>
-      <p:grpSpPr>
-        <a:xfrm>
-          <a:off x="0" y="0"/>
-          <a:ext cx="0" cy="0"/>
-          <a:chOff x="0" y="0"/>
-          <a:chExt cx="0" cy="0"/>
-        </a:xfrm>
-      </p:grpSpPr>
-      <p:sp>
-        <p:nvSpPr>
-          <p:cNvPr id="2" name="Title 1">
-            <a:extLst>
-              <a:ext uri="{FF2B5EF4-FFF2-40B4-BE49-F238E27FC236}">
-                <a16:creationId xmlns:a16="http://schemas.microsoft.com/office/drawing/2014/main" id="{04109278-47BD-47C3-AE4E-95F90EAA9D03}"/>
-              </a:ext>
-            </a:extLst>
-          </p:cNvPr>
-          <p:cNvSpPr>
-            <a:spLocks noGrp="1"/>
-          </p:cNvSpPr>
-          <p:nvPr>
-            <p:ph type="ctrTitle"/>
-          </p:nvPr>
-        </p:nvSpPr>
-        <p:spPr/>
-        <p:txBody>
-          <a:bodyPr/>
-          <a:lstStyle/>
-          <a:p>
-            <a:endParaRPr lang="en-US" dirty="0"/>
-          </a:p>
-        </p:txBody>
-      </p:sp>
-      <p:sp>
-        <p:nvSpPr>
-          <p:cNvPr id="3" name="Subtitle 2">
-            <a:extLst>
-              <a:ext uri="{FF2B5EF4-FFF2-40B4-BE49-F238E27FC236}">
-                <a16:creationId xmlns:a16="http://schemas.microsoft.com/office/drawing/2014/main" id="{0A72F5FB-2E1A-46A0-B8D5-9656C49BF9CB}"/>
-              </a:ext>
-            </a:extLst>
-          </p:cNvPr>
-          <p:cNvSpPr>
-            <a:spLocks noGrp="1"/>
-          </p:cNvSpPr>
-          <p:nvPr>
-            <p:ph type="subTitle" idx="1"/>
-          </p:nvPr>
-        </p:nvSpPr>
-        <p:spPr/>
-        <p:txBody>
-          <a:bodyPr/>
-          <a:lstStyle/>
-          <a:p>
-            <a:endParaRPr lang="en-US" dirty="0"/>
-          </a:p>
-        </p:txBody>
-      </p:sp>
-      <p:pic>
-        <p:nvPicPr>
-          <p:cNvPr id="5" name="Picture 4" descr="A picture containing transport, wheel&#10;&#10;Description automatically generated">
-            <a:extLst>
-              <a:ext uri="{FF2B5EF4-FFF2-40B4-BE49-F238E27FC236}">
-                <a16:creationId xmlns:a16="http://schemas.microsoft.com/office/drawing/2014/main" id="{6F4B2307-C614-41CF-9CFB-DF30627D111E}"/>
-              </a:ext>
-            </a:extLst>
-          </p:cNvPr>
-          <p:cNvPicPr>
-            <a:picLocks noChangeAspect="1"/>
-          </p:cNvPicPr>
-          <p:nvPr/>
-        </p:nvPicPr>
-        <p:blipFill>
-          <a:blip r:embed="rId3">
-            <a:extLst>
-              <a:ext uri="{28A0092B-C50C-407E-A947-70E740481C1C}">
-                <a14:useLocalDpi xmlns:a14="http://schemas.microsoft.com/office/drawing/2010/main" val="0"/>
-              </a:ext>
-            </a:extLst>
-          </a:blip>
-          <a:stretch>
-            <a:fillRect/>
-          </a:stretch>
-        </p:blipFill>
-        <p:spPr>
-          <a:xfrm>
-            <a:off x="0" y="381000"/>
-            <a:ext cx="12192000" cy="6096000"/>
-          </a:xfrm>
-          <a:prstGeom prst="rect">
-            <a:avLst/>
-          </a:prstGeom>
-        </p:spPr>
-      </p:pic>
-      <p:sp>
-        <p:nvSpPr>
-          <p:cNvPr id="6" name="Footer Placeholder 5">
-            <a:extLst>
-              <a:ext uri="{FF2B5EF4-FFF2-40B4-BE49-F238E27FC236}">
-                <a16:creationId xmlns:a16="http://schemas.microsoft.com/office/drawing/2014/main" id="{E8F74017-6313-481A-82EF-5B6931027FB9}"/>
-              </a:ext>
-            </a:extLst>
-          </p:cNvPr>
-          <p:cNvSpPr>
-            <a:spLocks noGrp="1"/>
-          </p:cNvSpPr>
-          <p:nvPr>
-            <p:ph type="ftr" sz="quarter" idx="11"/>
-          </p:nvPr>
-        </p:nvSpPr>
-        <p:spPr/>
-        <p:txBody>
-          <a:bodyPr/>
-          <a:lstStyle/>
-          <a:p>
-            <a:r>
-              <a:rPr lang="en-US" dirty="0"/>
-              <a:t>By Caleb Trachte</a:t>
-            </a:r>
-          </a:p>
-          <a:p>
-            <a:r>
-              <a:rPr lang="en-US" dirty="0"/>
-              <a:t>Last Updated: 07/10/2020</a:t>
-            </a:r>
-          </a:p>
-        </p:txBody>
-      </p:sp>
-    </p:spTree>
-    <p:extLst>
-      <p:ext uri="{BB962C8B-B14F-4D97-AF65-F5344CB8AC3E}">
-        <p14:creationId xmlns:p14="http://schemas.microsoft.com/office/powerpoint/2010/main" val="3369542898"/>
-      </p:ext>
-    </p:extLst>
-  </p:cSld>
-  <p:clrMapOvr>
-    <a:masterClrMapping/>
-  </p:clrMapOvr>
-</p:sld>
-</file>
-
-<file path=ppt/slides/slide3.xml><?xml version="1.0" encoding="utf-8"?>
-<p:sld xmlns:a="http://schemas.openxmlformats.org/drawingml/2006/main" xmlns:r="http://schemas.openxmlformats.org/officeDocument/2006/relationships" xmlns:p="http://schemas.openxmlformats.org/presentationml/2006/main">
-  <p:cSld>
     <p:bg>
       <p:bgPr>
         <a:solidFill>
@@ -6395,7 +5995,7 @@
 </p:sld>
 </file>
 
-<file path=ppt/slides/slide4.xml><?xml version="1.0" encoding="utf-8"?>
+<file path=ppt/slides/slide3.xml><?xml version="1.0" encoding="utf-8"?>
 <p:sld xmlns:a="http://schemas.openxmlformats.org/drawingml/2006/main" xmlns:r="http://schemas.openxmlformats.org/officeDocument/2006/relationships" xmlns:p="http://schemas.openxmlformats.org/presentationml/2006/main">
   <p:cSld>
     <p:bg>
@@ -7392,7 +6992,7 @@
 </p:sld>
 </file>
 
-<file path=ppt/slides/slide5.xml><?xml version="1.0" encoding="utf-8"?>
+<file path=ppt/slides/slide4.xml><?xml version="1.0" encoding="utf-8"?>
 <p:sld xmlns:a="http://schemas.openxmlformats.org/drawingml/2006/main" xmlns:r="http://schemas.openxmlformats.org/officeDocument/2006/relationships" xmlns:p="http://schemas.openxmlformats.org/presentationml/2006/main">
   <p:cSld>
     <p:bg>
@@ -7830,8 +7430,8 @@
         </p:blipFill>
         <p:spPr>
           <a:xfrm>
-            <a:off x="6174781" y="4388406"/>
-            <a:ext cx="5344271" cy="1686160"/>
+            <a:off x="6174781" y="4388405"/>
+            <a:ext cx="5344273" cy="1686161"/>
           </a:xfrm>
           <a:prstGeom prst="rect">
             <a:avLst/>
@@ -8157,7 +7757,7 @@
 </p:sld>
 </file>
 
-<file path=ppt/slides/slide6.xml><?xml version="1.0" encoding="utf-8"?>
+<file path=ppt/slides/slide5.xml><?xml version="1.0" encoding="utf-8"?>
 <p:sld xmlns:a="http://schemas.openxmlformats.org/drawingml/2006/main" xmlns:r="http://schemas.openxmlformats.org/officeDocument/2006/relationships" xmlns:p="http://schemas.openxmlformats.org/presentationml/2006/main">
   <p:cSld>
     <p:bg>
@@ -8522,7 +8122,20 @@
                   <a:schemeClr val="bg1"/>
                 </a:solidFill>
               </a:rPr>
-              <a:t>Most high-level programming languages have some sort of garbage collection built in. Low-level programming languages may add garbage collection through libraries. </a:t>
+              <a:t>Most high-level programming languages – JavaScript in particular - have some sort of garbage collection built in.</a:t>
+            </a:r>
+          </a:p>
+          <a:p>
+            <a:pPr marL="0" indent="0">
+              <a:buNone/>
+            </a:pPr>
+            <a:r>
+              <a:rPr lang="en-US" sz="2200" dirty="0">
+                <a:solidFill>
+                  <a:schemeClr val="bg1"/>
+                </a:solidFill>
+              </a:rPr>
+              <a:t>Low-level programming languages may add garbage collection through libraries. </a:t>
             </a:r>
           </a:p>
           <a:p>
@@ -9060,6 +8673,67 @@
                       </p:childTnLst>
                     </p:cTn>
                   </p:par>
+                  <p:par>
+                    <p:cTn id="33" fill="hold">
+                      <p:stCondLst>
+                        <p:cond delay="indefinite"/>
+                      </p:stCondLst>
+                      <p:childTnLst>
+                        <p:par>
+                          <p:cTn id="34" fill="hold">
+                            <p:stCondLst>
+                              <p:cond delay="0"/>
+                            </p:stCondLst>
+                            <p:childTnLst>
+                              <p:par>
+                                <p:cTn id="35" presetID="10" presetClass="entr" presetSubtype="0" fill="hold" grpId="0" nodeType="clickEffect">
+                                  <p:stCondLst>
+                                    <p:cond delay="0"/>
+                                  </p:stCondLst>
+                                  <p:childTnLst>
+                                    <p:set>
+                                      <p:cBhvr>
+                                        <p:cTn id="36" dur="1" fill="hold">
+                                          <p:stCondLst>
+                                            <p:cond delay="0"/>
+                                          </p:stCondLst>
+                                        </p:cTn>
+                                        <p:tgtEl>
+                                          <p:spTgt spid="3">
+                                            <p:txEl>
+                                              <p:pRg st="6" end="6"/>
+                                            </p:txEl>
+                                          </p:spTgt>
+                                        </p:tgtEl>
+                                        <p:attrNameLst>
+                                          <p:attrName>style.visibility</p:attrName>
+                                        </p:attrNameLst>
+                                      </p:cBhvr>
+                                      <p:to>
+                                        <p:strVal val="visible"/>
+                                      </p:to>
+                                    </p:set>
+                                    <p:animEffect transition="in" filter="fade">
+                                      <p:cBhvr>
+                                        <p:cTn id="37" dur="500"/>
+                                        <p:tgtEl>
+                                          <p:spTgt spid="3">
+                                            <p:txEl>
+                                              <p:pRg st="6" end="6"/>
+                                            </p:txEl>
+                                          </p:spTgt>
+                                        </p:tgtEl>
+                                      </p:cBhvr>
+                                    </p:animEffect>
+                                  </p:childTnLst>
+                                </p:cTn>
+                              </p:par>
+                            </p:childTnLst>
+                          </p:cTn>
+                        </p:par>
+                      </p:childTnLst>
+                    </p:cTn>
+                  </p:par>
                 </p:childTnLst>
               </p:cTn>
               <p:prevCondLst>
@@ -9088,7 +8762,7 @@
 </p:sld>
 </file>
 
-<file path=ppt/slides/slide7.xml><?xml version="1.0" encoding="utf-8"?>
+<file path=ppt/slides/slide6.xml><?xml version="1.0" encoding="utf-8"?>
 <p:sld xmlns:a="http://schemas.openxmlformats.org/drawingml/2006/main" xmlns:r="http://schemas.openxmlformats.org/officeDocument/2006/relationships" xmlns:p="http://schemas.openxmlformats.org/presentationml/2006/main">
   <p:cSld>
     <p:bg>
@@ -9143,7 +8817,7 @@
           <a:p>
             <a:pPr algn="ctr"/>
             <a:r>
-              <a:rPr lang="en-US" kern="1200" dirty="0">
+              <a:rPr lang="en-US" kern="1200">
                 <a:solidFill>
                   <a:schemeClr val="tx1"/>
                 </a:solidFill>
@@ -9153,6 +8827,14 @@
               </a:rPr>
               <a:t>Ownership</a:t>
             </a:r>
+            <a:endParaRPr lang="en-US" kern="1200" dirty="0">
+              <a:solidFill>
+                <a:schemeClr val="tx1"/>
+              </a:solidFill>
+              <a:latin typeface="+mj-lt"/>
+              <a:ea typeface="+mj-ea"/>
+              <a:cs typeface="+mj-cs"/>
+            </a:endParaRPr>
           </a:p>
         </p:txBody>
       </p:sp>
@@ -9174,13 +8856,13 @@
         </p:nvSpPr>
         <p:spPr>
           <a:xfrm>
-            <a:off x="4033837" y="1411125"/>
-            <a:ext cx="4114800" cy="365125"/>
+            <a:off x="2739991" y="5610808"/>
+            <a:ext cx="6603061" cy="749883"/>
           </a:xfrm>
         </p:spPr>
         <p:txBody>
           <a:bodyPr vert="horz" lIns="91440" tIns="45720" rIns="91440" bIns="45720" rtlCol="0" anchor="ctr">
-            <a:normAutofit fontScale="92500"/>
+            <a:normAutofit fontScale="92500" lnSpcReduction="10000"/>
           </a:bodyPr>
           <a:lstStyle/>
           <a:p>
@@ -9197,6 +8879,49 @@
                 <a:hlinkClick r:id="rId3"/>
               </a:rPr>
               <a:t>https://doc.rust-lang.org/book/ch04-01-what-is-ownership.html</a:t>
+            </a:r>
+            <a:endParaRPr lang="en-US" sz="1200" dirty="0"/>
+          </a:p>
+          <a:p>
+            <a:pPr>
+              <a:lnSpc>
+                <a:spcPct val="90000"/>
+              </a:lnSpc>
+              <a:spcAft>
+                <a:spcPts val="600"/>
+              </a:spcAft>
+            </a:pPr>
+            <a:r>
+              <a:rPr lang="en-US" sz="1000" kern="1200" dirty="0" err="1">
+                <a:solidFill>
+                  <a:schemeClr val="tx1">
+                    <a:tint val="75000"/>
+                  </a:schemeClr>
+                </a:solidFill>
+                <a:latin typeface="+mn-lt"/>
+                <a:ea typeface="+mn-ea"/>
+                <a:cs typeface="+mn-cs"/>
+              </a:rPr>
+              <a:t>Countz</a:t>
+            </a:r>
+            <a:r>
+              <a:rPr lang="en-US" sz="1000" kern="1200" dirty="0">
+                <a:solidFill>
+                  <a:schemeClr val="tx1">
+                    <a:tint val="75000"/>
+                  </a:schemeClr>
+                </a:solidFill>
+                <a:latin typeface="+mn-lt"/>
+                <a:ea typeface="+mn-ea"/>
+                <a:cs typeface="+mn-cs"/>
+              </a:rPr>
+              <a:t>, 2018 </a:t>
+            </a:r>
+            <a:r>
+              <a:rPr lang="en-US" sz="1200" dirty="0">
+                <a:hlinkClick r:id="rId4"/>
+              </a:rPr>
+              <a:t>https://medium.com/@thomascountz/ownership-in-rust-part-1-112036b1126b#:~:text=There%20are%20three%20rules%20about,one%20owner%20at%20a%20time.&amp;text=It%20seems%20like%20when%20using,it%20moves%20the%20value%20instead.</a:t>
             </a:r>
             <a:endParaRPr lang="en-US" sz="1000" kern="1200" dirty="0">
               <a:solidFill>
@@ -9226,7 +8951,7 @@
           <p:nvPr/>
         </p:nvPicPr>
         <p:blipFill>
-          <a:blip r:embed="rId4">
+          <a:blip r:embed="rId5">
             <a:extLst>
               <a:ext uri="{28A0092B-C50C-407E-A947-70E740481C1C}">
                 <a14:useLocalDpi xmlns:a14="http://schemas.microsoft.com/office/drawing/2010/main" val="0"/>
@@ -9245,6 +8970,51 @@
           <a:prstGeom prst="rect">
             <a:avLst/>
           </a:prstGeom>
+        </p:spPr>
+      </p:pic>
+      <p:pic>
+        <p:nvPicPr>
+          <p:cNvPr id="6" name="Picture 5" descr="A screenshot of a cell phone&#10;&#10;Description automatically generated">
+            <a:extLst>
+              <a:ext uri="{FF2B5EF4-FFF2-40B4-BE49-F238E27FC236}">
+                <a16:creationId xmlns:a16="http://schemas.microsoft.com/office/drawing/2014/main" id="{EF3CBAAB-3216-459A-9C71-2361472709F3}"/>
+              </a:ext>
+            </a:extLst>
+          </p:cNvPr>
+          <p:cNvPicPr>
+            <a:picLocks noChangeAspect="1"/>
+          </p:cNvPicPr>
+          <p:nvPr/>
+        </p:nvPicPr>
+        <p:blipFill rotWithShape="1">
+          <a:blip r:embed="rId6">
+            <a:extLst>
+              <a:ext uri="{28A0092B-C50C-407E-A947-70E740481C1C}">
+                <a14:useLocalDpi xmlns:a14="http://schemas.microsoft.com/office/drawing/2010/main" val="0"/>
+              </a:ext>
+            </a:extLst>
+          </a:blip>
+          <a:srcRect l="2956" t="52"/>
+          <a:stretch/>
+        </p:blipFill>
+        <p:spPr>
+          <a:xfrm>
+            <a:off x="8683511" y="874929"/>
+            <a:ext cx="2499798" cy="3168167"/>
+          </a:xfrm>
+          <a:prstGeom prst="rect">
+            <a:avLst/>
+          </a:prstGeom>
+          <a:ln>
+            <a:noFill/>
+          </a:ln>
+          <a:effectLst>
+            <a:outerShdw blurRad="292100" dist="139700" dir="2700000" algn="tl" rotWithShape="0">
+              <a:srgbClr val="333333">
+                <a:alpha val="65000"/>
+              </a:srgbClr>
+            </a:outerShdw>
+          </a:effectLst>
         </p:spPr>
       </p:pic>
     </p:spTree>
@@ -9272,7 +9042,7 @@
 </p:sld>
 </file>
 
-<file path=ppt/slides/slide8.xml><?xml version="1.0" encoding="utf-8"?>
+<file path=ppt/slides/slide7.xml><?xml version="1.0" encoding="utf-8"?>
 <p:sld xmlns:a="http://schemas.openxmlformats.org/drawingml/2006/main" xmlns:r="http://schemas.openxmlformats.org/officeDocument/2006/relationships" xmlns:p="http://schemas.openxmlformats.org/presentationml/2006/main">
   <p:cSld>
     <p:bg>
@@ -9841,7 +9611,7 @@
 </p:sld>
 </file>
 
-<file path=ppt/slides/slide9.xml><?xml version="1.0" encoding="utf-8"?>
+<file path=ppt/slides/slide8.xml><?xml version="1.0" encoding="utf-8"?>
 <p:sld xmlns:a="http://schemas.openxmlformats.org/drawingml/2006/main" xmlns:r="http://schemas.openxmlformats.org/officeDocument/2006/relationships" xmlns:p="http://schemas.openxmlformats.org/presentationml/2006/main">
   <p:cSld>
     <p:bg>
@@ -10054,6 +9824,206 @@
     <p:extLst>
       <p:ext uri="{BB962C8B-B14F-4D97-AF65-F5344CB8AC3E}">
         <p14:creationId xmlns:p14="http://schemas.microsoft.com/office/powerpoint/2010/main" val="985327731"/>
+      </p:ext>
+    </p:extLst>
+  </p:cSld>
+  <p:clrMapOvr>
+    <a:masterClrMapping/>
+  </p:clrMapOvr>
+  <mc:AlternateContent xmlns:mc="http://schemas.openxmlformats.org/markup-compatibility/2006" xmlns:p14="http://schemas.microsoft.com/office/powerpoint/2010/main">
+    <mc:Choice Requires="p14">
+      <p:transition spd="med" p14:dur="700">
+        <p:fade/>
+      </p:transition>
+    </mc:Choice>
+    <mc:Fallback xmlns="">
+      <p:transition spd="med">
+        <p:fade/>
+      </p:transition>
+    </mc:Fallback>
+  </mc:AlternateContent>
+</p:sld>
+</file>
+
+<file path=ppt/slides/slide9.xml><?xml version="1.0" encoding="utf-8"?>
+<p:sld xmlns:a="http://schemas.openxmlformats.org/drawingml/2006/main" xmlns:r="http://schemas.openxmlformats.org/officeDocument/2006/relationships" xmlns:p="http://schemas.openxmlformats.org/presentationml/2006/main">
+  <p:cSld>
+    <p:bg>
+      <p:bgPr>
+        <a:solidFill>
+          <a:schemeClr val="bg1"/>
+        </a:solidFill>
+        <a:effectLst/>
+      </p:bgPr>
+    </p:bg>
+    <p:spTree>
+      <p:nvGrpSpPr>
+        <p:cNvPr id="1" name=""/>
+        <p:cNvGrpSpPr/>
+        <p:nvPr/>
+      </p:nvGrpSpPr>
+      <p:grpSpPr>
+        <a:xfrm>
+          <a:off x="0" y="0"/>
+          <a:ext cx="0" cy="0"/>
+          <a:chOff x="0" y="0"/>
+          <a:chExt cx="0" cy="0"/>
+        </a:xfrm>
+      </p:grpSpPr>
+      <p:sp>
+        <p:nvSpPr>
+          <p:cNvPr id="2" name="Title 1">
+            <a:extLst>
+              <a:ext uri="{FF2B5EF4-FFF2-40B4-BE49-F238E27FC236}">
+                <a16:creationId xmlns:a16="http://schemas.microsoft.com/office/drawing/2014/main" id="{E4326CFC-8929-4EAA-AACB-65A09AC72B19}"/>
+              </a:ext>
+            </a:extLst>
+          </p:cNvPr>
+          <p:cNvSpPr>
+            <a:spLocks noGrp="1"/>
+          </p:cNvSpPr>
+          <p:nvPr>
+            <p:ph type="title"/>
+          </p:nvPr>
+        </p:nvSpPr>
+        <p:spPr>
+          <a:xfrm>
+            <a:off x="838200" y="365125"/>
+            <a:ext cx="10515600" cy="1325563"/>
+          </a:xfrm>
+        </p:spPr>
+        <p:txBody>
+          <a:bodyPr vert="horz" lIns="91440" tIns="45720" rIns="91440" bIns="45720" rtlCol="0" anchor="ctr">
+            <a:normAutofit/>
+          </a:bodyPr>
+          <a:lstStyle/>
+          <a:p>
+            <a:pPr algn="ctr"/>
+            <a:r>
+              <a:rPr lang="en-US" kern="1200">
+                <a:solidFill>
+                  <a:schemeClr val="tx1"/>
+                </a:solidFill>
+                <a:latin typeface="+mj-lt"/>
+                <a:ea typeface="+mj-ea"/>
+                <a:cs typeface="+mj-cs"/>
+              </a:rPr>
+              <a:t>Shadowing</a:t>
+            </a:r>
+            <a:endParaRPr lang="en-US" kern="1200" dirty="0">
+              <a:solidFill>
+                <a:schemeClr val="tx1"/>
+              </a:solidFill>
+              <a:latin typeface="+mj-lt"/>
+              <a:ea typeface="+mj-ea"/>
+              <a:cs typeface="+mj-cs"/>
+            </a:endParaRPr>
+          </a:p>
+        </p:txBody>
+      </p:sp>
+      <p:pic>
+        <p:nvPicPr>
+          <p:cNvPr id="5" name="Picture 4" descr="A screenshot of a cell phone&#10;&#10;Description automatically generated">
+            <a:extLst>
+              <a:ext uri="{FF2B5EF4-FFF2-40B4-BE49-F238E27FC236}">
+                <a16:creationId xmlns:a16="http://schemas.microsoft.com/office/drawing/2014/main" id="{36860D48-756D-4CE3-BEEF-CBF2FA115799}"/>
+              </a:ext>
+            </a:extLst>
+          </p:cNvPr>
+          <p:cNvPicPr>
+            <a:picLocks noChangeAspect="1"/>
+          </p:cNvPicPr>
+          <p:nvPr/>
+        </p:nvPicPr>
+        <p:blipFill>
+          <a:blip r:embed="rId2">
+            <a:extLst>
+              <a:ext uri="{28A0092B-C50C-407E-A947-70E740481C1C}">
+                <a14:useLocalDpi xmlns:a14="http://schemas.microsoft.com/office/drawing/2010/main" val="0"/>
+              </a:ext>
+            </a:extLst>
+          </a:blip>
+          <a:stretch>
+            <a:fillRect/>
+          </a:stretch>
+        </p:blipFill>
+        <p:spPr>
+          <a:xfrm>
+            <a:off x="828675" y="2106773"/>
+            <a:ext cx="10525125" cy="3789043"/>
+          </a:xfrm>
+          <a:prstGeom prst="rect">
+            <a:avLst/>
+          </a:prstGeom>
+        </p:spPr>
+      </p:pic>
+      <p:sp>
+        <p:nvSpPr>
+          <p:cNvPr id="4" name="Footer Placeholder 3">
+            <a:extLst>
+              <a:ext uri="{FF2B5EF4-FFF2-40B4-BE49-F238E27FC236}">
+                <a16:creationId xmlns:a16="http://schemas.microsoft.com/office/drawing/2014/main" id="{983E1BA2-D9FD-41BC-AC0D-55687EE8BF9E}"/>
+              </a:ext>
+            </a:extLst>
+          </p:cNvPr>
+          <p:cNvSpPr>
+            <a:spLocks noGrp="1"/>
+          </p:cNvSpPr>
+          <p:nvPr>
+            <p:ph type="ftr" sz="quarter" idx="11"/>
+          </p:nvPr>
+        </p:nvSpPr>
+        <p:spPr>
+          <a:xfrm>
+            <a:off x="4033837" y="1411125"/>
+            <a:ext cx="4114800" cy="365125"/>
+          </a:xfrm>
+        </p:spPr>
+        <p:txBody>
+          <a:bodyPr vert="horz" lIns="91440" tIns="45720" rIns="91440" bIns="45720" rtlCol="0" anchor="ctr">
+            <a:normAutofit/>
+          </a:bodyPr>
+          <a:lstStyle/>
+          <a:p>
+            <a:pPr>
+              <a:lnSpc>
+                <a:spcPct val="90000"/>
+              </a:lnSpc>
+              <a:spcAft>
+                <a:spcPts val="600"/>
+              </a:spcAft>
+            </a:pPr>
+            <a:r>
+              <a:rPr lang="en-US" sz="1000" kern="1200" dirty="0">
+                <a:solidFill>
+                  <a:schemeClr val="tx1">
+                    <a:tint val="75000"/>
+                  </a:schemeClr>
+                </a:solidFill>
+                <a:latin typeface="+mn-lt"/>
+                <a:ea typeface="+mn-ea"/>
+                <a:cs typeface="+mn-cs"/>
+                <a:hlinkClick r:id="rId3"/>
+              </a:rPr>
+              <a:t> https://doc.rust-lang.org/book/ch03-01-variables-and-mutability.html</a:t>
+            </a:r>
+            <a:endParaRPr lang="en-US" sz="1000" kern="1200" dirty="0">
+              <a:solidFill>
+                <a:schemeClr val="tx1">
+                  <a:tint val="75000"/>
+                </a:schemeClr>
+              </a:solidFill>
+              <a:latin typeface="+mn-lt"/>
+              <a:ea typeface="+mn-ea"/>
+              <a:cs typeface="+mn-cs"/>
+            </a:endParaRPr>
+          </a:p>
+        </p:txBody>
+      </p:sp>
+    </p:spTree>
+    <p:extLst>
+      <p:ext uri="{BB962C8B-B14F-4D97-AF65-F5344CB8AC3E}">
+        <p14:creationId xmlns:p14="http://schemas.microsoft.com/office/powerpoint/2010/main" val="3758640645"/>
       </p:ext>
     </p:extLst>
   </p:cSld>

</xml_diff>

<commit_message>
add logo and about, update ppt
</commit_message>
<xml_diff>
--- a/RustIntro.pptx
+++ b/RustIntro.pptx
@@ -5,20 +5,21 @@
     <p:sldMasterId id="2147483648" r:id="rId1"/>
   </p:sldMasterIdLst>
   <p:notesMasterIdLst>
-    <p:notesMasterId r:id="rId13"/>
+    <p:notesMasterId r:id="rId14"/>
   </p:notesMasterIdLst>
   <p:sldIdLst>
     <p:sldId id="265" r:id="rId2"/>
-    <p:sldId id="257" r:id="rId3"/>
-    <p:sldId id="260" r:id="rId4"/>
-    <p:sldId id="258" r:id="rId5"/>
-    <p:sldId id="259" r:id="rId6"/>
-    <p:sldId id="267" r:id="rId7"/>
-    <p:sldId id="264" r:id="rId8"/>
-    <p:sldId id="262" r:id="rId9"/>
-    <p:sldId id="263" r:id="rId10"/>
-    <p:sldId id="266" r:id="rId11"/>
-    <p:sldId id="261" r:id="rId12"/>
+    <p:sldId id="268" r:id="rId3"/>
+    <p:sldId id="257" r:id="rId4"/>
+    <p:sldId id="260" r:id="rId5"/>
+    <p:sldId id="258" r:id="rId6"/>
+    <p:sldId id="259" r:id="rId7"/>
+    <p:sldId id="267" r:id="rId8"/>
+    <p:sldId id="264" r:id="rId9"/>
+    <p:sldId id="262" r:id="rId10"/>
+    <p:sldId id="263" r:id="rId11"/>
+    <p:sldId id="266" r:id="rId12"/>
+    <p:sldId id="261" r:id="rId13"/>
   </p:sldIdLst>
   <p:sldSz cx="12192000" cy="6858000"/>
   <p:notesSz cx="6858000" cy="9144000"/>
@@ -207,7 +208,7 @@
           <a:p>
             <a:fld id="{F5D7967C-BE0C-4865-9A87-53F83D2C2106}" type="datetimeFigureOut">
               <a:rPr lang="en-US" smtClean="0"/>
-              <a:t>8/19/2020</a:t>
+              <a:t>8/20/2020</a:t>
             </a:fld>
             <a:endParaRPr lang="en-US"/>
           </a:p>
@@ -623,7 +624,7 @@
           <a:p>
             <a:fld id="{B891341A-8AB9-4FB5-850B-4CBCD13A163C}" type="slidenum">
               <a:rPr lang="en-US" smtClean="0"/>
-              <a:t>6</a:t>
+              <a:t>7</a:t>
             </a:fld>
             <a:endParaRPr lang="en-US"/>
           </a:p>
@@ -707,7 +708,7 @@
           <a:p>
             <a:fld id="{B891341A-8AB9-4FB5-850B-4CBCD13A163C}" type="slidenum">
               <a:rPr lang="en-US" smtClean="0"/>
-              <a:t>11</a:t>
+              <a:t>12</a:t>
             </a:fld>
             <a:endParaRPr lang="en-US"/>
           </a:p>
@@ -873,7 +874,7 @@
           <a:p>
             <a:fld id="{2BE63B19-0516-4569-B712-8EC5C5FC73D7}" type="datetime1">
               <a:rPr lang="en-US" smtClean="0"/>
-              <a:t>8/19/2020</a:t>
+              <a:t>8/20/2020</a:t>
             </a:fld>
             <a:endParaRPr lang="en-US"/>
           </a:p>
@@ -1074,7 +1075,7 @@
           <a:p>
             <a:fld id="{43868FD8-0AD7-4E1F-9181-3C53BA169C86}" type="datetime1">
               <a:rPr lang="en-US" smtClean="0"/>
-              <a:t>8/19/2020</a:t>
+              <a:t>8/20/2020</a:t>
             </a:fld>
             <a:endParaRPr lang="en-US"/>
           </a:p>
@@ -1285,7 +1286,7 @@
           <a:p>
             <a:fld id="{8ABE26B9-926F-4C00-8E0D-BB88A26F3D37}" type="datetime1">
               <a:rPr lang="en-US" smtClean="0"/>
-              <a:t>8/19/2020</a:t>
+              <a:t>8/20/2020</a:t>
             </a:fld>
             <a:endParaRPr lang="en-US"/>
           </a:p>
@@ -1486,7 +1487,7 @@
           <a:p>
             <a:fld id="{36AE9653-09A4-4A1A-86A2-22EA13F9AAFB}" type="datetime1">
               <a:rPr lang="en-US" smtClean="0"/>
-              <a:t>8/19/2020</a:t>
+              <a:t>8/20/2020</a:t>
             </a:fld>
             <a:endParaRPr lang="en-US"/>
           </a:p>
@@ -1764,7 +1765,7 @@
           <a:p>
             <a:fld id="{FCC1FEA8-435A-48E4-9E4C-E82C791266DE}" type="datetime1">
               <a:rPr lang="en-US" smtClean="0"/>
-              <a:t>8/19/2020</a:t>
+              <a:t>8/20/2020</a:t>
             </a:fld>
             <a:endParaRPr lang="en-US"/>
           </a:p>
@@ -2032,7 +2033,7 @@
           <a:p>
             <a:fld id="{9769E967-A411-4969-B358-58EEDD1723EE}" type="datetime1">
               <a:rPr lang="en-US" smtClean="0"/>
-              <a:t>8/19/2020</a:t>
+              <a:t>8/20/2020</a:t>
             </a:fld>
             <a:endParaRPr lang="en-US"/>
           </a:p>
@@ -2447,7 +2448,7 @@
           <a:p>
             <a:fld id="{26CF9157-5643-4813-B559-CF3A43EAA586}" type="datetime1">
               <a:rPr lang="en-US" smtClean="0"/>
-              <a:t>8/19/2020</a:t>
+              <a:t>8/20/2020</a:t>
             </a:fld>
             <a:endParaRPr lang="en-US"/>
           </a:p>
@@ -2591,7 +2592,7 @@
           <a:p>
             <a:fld id="{E5091FD3-9EDF-4236-9615-03497DEC2F25}" type="datetime1">
               <a:rPr lang="en-US" smtClean="0"/>
-              <a:t>8/19/2020</a:t>
+              <a:t>8/20/2020</a:t>
             </a:fld>
             <a:endParaRPr lang="en-US"/>
           </a:p>
@@ -2707,7 +2708,7 @@
           <a:p>
             <a:fld id="{FD6AEB59-C6D9-473C-94BA-47DA9C5809A3}" type="datetime1">
               <a:rPr lang="en-US" smtClean="0"/>
-              <a:t>8/19/2020</a:t>
+              <a:t>8/20/2020</a:t>
             </a:fld>
             <a:endParaRPr lang="en-US"/>
           </a:p>
@@ -3021,7 +3022,7 @@
           <a:p>
             <a:fld id="{9FFF7D38-572C-4D10-80C7-509477EF5803}" type="datetime1">
               <a:rPr lang="en-US" smtClean="0"/>
-              <a:t>8/19/2020</a:t>
+              <a:t>8/20/2020</a:t>
             </a:fld>
             <a:endParaRPr lang="en-US"/>
           </a:p>
@@ -3312,7 +3313,7 @@
           <a:p>
             <a:fld id="{63251C4F-8DAA-445A-9204-38B149BE527B}" type="datetime1">
               <a:rPr lang="en-US" smtClean="0"/>
-              <a:t>8/19/2020</a:t>
+              <a:t>8/20/2020</a:t>
             </a:fld>
             <a:endParaRPr lang="en-US"/>
           </a:p>
@@ -3556,7 +3557,7 @@
           <a:p>
             <a:fld id="{9C53D9E6-3555-485D-B762-D68C9D979839}" type="datetime1">
               <a:rPr lang="en-US" smtClean="0"/>
-              <a:t>8/19/2020</a:t>
+              <a:t>8/20/2020</a:t>
             </a:fld>
             <a:endParaRPr lang="en-US"/>
           </a:p>
@@ -4079,20 +4080,27 @@
             <p:ph type="ftr" sz="quarter" idx="11"/>
           </p:nvPr>
         </p:nvSpPr>
-        <p:spPr/>
+        <p:spPr>
+          <a:xfrm>
+            <a:off x="7825273" y="6029237"/>
+            <a:ext cx="4114800" cy="365125"/>
+          </a:xfrm>
+        </p:spPr>
         <p:txBody>
           <a:bodyPr/>
           <a:lstStyle/>
           <a:p>
+            <a:pPr algn="r"/>
             <a:r>
               <a:rPr lang="en-US" dirty="0"/>
               <a:t>By Caleb Trachte</a:t>
             </a:r>
           </a:p>
           <a:p>
+            <a:pPr algn="r"/>
             <a:r>
               <a:rPr lang="en-US" dirty="0"/>
-              <a:t>Last Updated: 08/19/2020</a:t>
+              <a:t>Last Updated: 08/20/2020</a:t>
             </a:r>
           </a:p>
         </p:txBody>
@@ -4132,6 +4140,42 @@
           </a:p>
         </p:txBody>
       </p:sp>
+      <p:pic>
+        <p:nvPicPr>
+          <p:cNvPr id="8" name="Picture 7">
+            <a:extLst>
+              <a:ext uri="{FF2B5EF4-FFF2-40B4-BE49-F238E27FC236}">
+                <a16:creationId xmlns:a16="http://schemas.microsoft.com/office/drawing/2014/main" id="{BC1C61D7-547A-4A07-8615-7DFF5A759F72}"/>
+              </a:ext>
+            </a:extLst>
+          </p:cNvPr>
+          <p:cNvPicPr>
+            <a:picLocks noChangeAspect="1"/>
+          </p:cNvPicPr>
+          <p:nvPr/>
+        </p:nvPicPr>
+        <p:blipFill>
+          <a:blip r:embed="rId4">
+            <a:extLst>
+              <a:ext uri="{28A0092B-C50C-407E-A947-70E740481C1C}">
+                <a14:useLocalDpi xmlns:a14="http://schemas.microsoft.com/office/drawing/2010/main" val="0"/>
+              </a:ext>
+            </a:extLst>
+          </a:blip>
+          <a:stretch>
+            <a:fillRect/>
+          </a:stretch>
+        </p:blipFill>
+        <p:spPr>
+          <a:xfrm>
+            <a:off x="10806033" y="4885799"/>
+            <a:ext cx="1134040" cy="1060800"/>
+          </a:xfrm>
+          <a:prstGeom prst="rect">
+            <a:avLst/>
+          </a:prstGeom>
+        </p:spPr>
+      </p:pic>
     </p:spTree>
     <p:extLst>
       <p:ext uri="{BB962C8B-B14F-4D97-AF65-F5344CB8AC3E}">
@@ -4146,6 +4190,206 @@
 </file>
 
 <file path=ppt/slides/slide10.xml><?xml version="1.0" encoding="utf-8"?>
+<p:sld xmlns:a="http://schemas.openxmlformats.org/drawingml/2006/main" xmlns:r="http://schemas.openxmlformats.org/officeDocument/2006/relationships" xmlns:p="http://schemas.openxmlformats.org/presentationml/2006/main">
+  <p:cSld>
+    <p:bg>
+      <p:bgPr>
+        <a:solidFill>
+          <a:schemeClr val="bg1"/>
+        </a:solidFill>
+        <a:effectLst/>
+      </p:bgPr>
+    </p:bg>
+    <p:spTree>
+      <p:nvGrpSpPr>
+        <p:cNvPr id="1" name=""/>
+        <p:cNvGrpSpPr/>
+        <p:nvPr/>
+      </p:nvGrpSpPr>
+      <p:grpSpPr>
+        <a:xfrm>
+          <a:off x="0" y="0"/>
+          <a:ext cx="0" cy="0"/>
+          <a:chOff x="0" y="0"/>
+          <a:chExt cx="0" cy="0"/>
+        </a:xfrm>
+      </p:grpSpPr>
+      <p:sp>
+        <p:nvSpPr>
+          <p:cNvPr id="2" name="Title 1">
+            <a:extLst>
+              <a:ext uri="{FF2B5EF4-FFF2-40B4-BE49-F238E27FC236}">
+                <a16:creationId xmlns:a16="http://schemas.microsoft.com/office/drawing/2014/main" id="{E4326CFC-8929-4EAA-AACB-65A09AC72B19}"/>
+              </a:ext>
+            </a:extLst>
+          </p:cNvPr>
+          <p:cNvSpPr>
+            <a:spLocks noGrp="1"/>
+          </p:cNvSpPr>
+          <p:nvPr>
+            <p:ph type="title"/>
+          </p:nvPr>
+        </p:nvSpPr>
+        <p:spPr>
+          <a:xfrm>
+            <a:off x="838200" y="365125"/>
+            <a:ext cx="10515600" cy="1325563"/>
+          </a:xfrm>
+        </p:spPr>
+        <p:txBody>
+          <a:bodyPr vert="horz" lIns="91440" tIns="45720" rIns="91440" bIns="45720" rtlCol="0" anchor="ctr">
+            <a:normAutofit/>
+          </a:bodyPr>
+          <a:lstStyle/>
+          <a:p>
+            <a:pPr algn="ctr"/>
+            <a:r>
+              <a:rPr lang="en-US" kern="1200">
+                <a:solidFill>
+                  <a:schemeClr val="tx1"/>
+                </a:solidFill>
+                <a:latin typeface="+mj-lt"/>
+                <a:ea typeface="+mj-ea"/>
+                <a:cs typeface="+mj-cs"/>
+              </a:rPr>
+              <a:t>Shadowing</a:t>
+            </a:r>
+            <a:endParaRPr lang="en-US" kern="1200" dirty="0">
+              <a:solidFill>
+                <a:schemeClr val="tx1"/>
+              </a:solidFill>
+              <a:latin typeface="+mj-lt"/>
+              <a:ea typeface="+mj-ea"/>
+              <a:cs typeface="+mj-cs"/>
+            </a:endParaRPr>
+          </a:p>
+        </p:txBody>
+      </p:sp>
+      <p:pic>
+        <p:nvPicPr>
+          <p:cNvPr id="5" name="Picture 4" descr="A screenshot of a cell phone&#10;&#10;Description automatically generated">
+            <a:extLst>
+              <a:ext uri="{FF2B5EF4-FFF2-40B4-BE49-F238E27FC236}">
+                <a16:creationId xmlns:a16="http://schemas.microsoft.com/office/drawing/2014/main" id="{36860D48-756D-4CE3-BEEF-CBF2FA115799}"/>
+              </a:ext>
+            </a:extLst>
+          </p:cNvPr>
+          <p:cNvPicPr>
+            <a:picLocks noChangeAspect="1"/>
+          </p:cNvPicPr>
+          <p:nvPr/>
+        </p:nvPicPr>
+        <p:blipFill>
+          <a:blip r:embed="rId2">
+            <a:extLst>
+              <a:ext uri="{28A0092B-C50C-407E-A947-70E740481C1C}">
+                <a14:useLocalDpi xmlns:a14="http://schemas.microsoft.com/office/drawing/2010/main" val="0"/>
+              </a:ext>
+            </a:extLst>
+          </a:blip>
+          <a:stretch>
+            <a:fillRect/>
+          </a:stretch>
+        </p:blipFill>
+        <p:spPr>
+          <a:xfrm>
+            <a:off x="828675" y="2106773"/>
+            <a:ext cx="10525125" cy="3789043"/>
+          </a:xfrm>
+          <a:prstGeom prst="rect">
+            <a:avLst/>
+          </a:prstGeom>
+        </p:spPr>
+      </p:pic>
+      <p:sp>
+        <p:nvSpPr>
+          <p:cNvPr id="4" name="Footer Placeholder 3">
+            <a:extLst>
+              <a:ext uri="{FF2B5EF4-FFF2-40B4-BE49-F238E27FC236}">
+                <a16:creationId xmlns:a16="http://schemas.microsoft.com/office/drawing/2014/main" id="{983E1BA2-D9FD-41BC-AC0D-55687EE8BF9E}"/>
+              </a:ext>
+            </a:extLst>
+          </p:cNvPr>
+          <p:cNvSpPr>
+            <a:spLocks noGrp="1"/>
+          </p:cNvSpPr>
+          <p:nvPr>
+            <p:ph type="ftr" sz="quarter" idx="11"/>
+          </p:nvPr>
+        </p:nvSpPr>
+        <p:spPr>
+          <a:xfrm>
+            <a:off x="4033837" y="1411125"/>
+            <a:ext cx="4114800" cy="365125"/>
+          </a:xfrm>
+        </p:spPr>
+        <p:txBody>
+          <a:bodyPr vert="horz" lIns="91440" tIns="45720" rIns="91440" bIns="45720" rtlCol="0" anchor="ctr">
+            <a:normAutofit/>
+          </a:bodyPr>
+          <a:lstStyle/>
+          <a:p>
+            <a:pPr>
+              <a:lnSpc>
+                <a:spcPct val="90000"/>
+              </a:lnSpc>
+              <a:spcAft>
+                <a:spcPts val="600"/>
+              </a:spcAft>
+            </a:pPr>
+            <a:r>
+              <a:rPr lang="en-US" sz="1000" kern="1200" dirty="0">
+                <a:solidFill>
+                  <a:schemeClr val="tx1">
+                    <a:tint val="75000"/>
+                  </a:schemeClr>
+                </a:solidFill>
+                <a:latin typeface="+mn-lt"/>
+                <a:ea typeface="+mn-ea"/>
+                <a:cs typeface="+mn-cs"/>
+                <a:hlinkClick r:id="rId3"/>
+              </a:rPr>
+              <a:t> https://doc.rust-lang.org/book/ch03-01-variables-and-mutability.html</a:t>
+            </a:r>
+            <a:endParaRPr lang="en-US" sz="1000" kern="1200" dirty="0">
+              <a:solidFill>
+                <a:schemeClr val="tx1">
+                  <a:tint val="75000"/>
+                </a:schemeClr>
+              </a:solidFill>
+              <a:latin typeface="+mn-lt"/>
+              <a:ea typeface="+mn-ea"/>
+              <a:cs typeface="+mn-cs"/>
+            </a:endParaRPr>
+          </a:p>
+        </p:txBody>
+      </p:sp>
+    </p:spTree>
+    <p:extLst>
+      <p:ext uri="{BB962C8B-B14F-4D97-AF65-F5344CB8AC3E}">
+        <p14:creationId xmlns:p14="http://schemas.microsoft.com/office/powerpoint/2010/main" val="3758640645"/>
+      </p:ext>
+    </p:extLst>
+  </p:cSld>
+  <p:clrMapOvr>
+    <a:masterClrMapping/>
+  </p:clrMapOvr>
+  <mc:AlternateContent xmlns:mc="http://schemas.openxmlformats.org/markup-compatibility/2006" xmlns:p14="http://schemas.microsoft.com/office/powerpoint/2010/main">
+    <mc:Choice Requires="p14">
+      <p:transition spd="med" p14:dur="700">
+        <p:fade/>
+      </p:transition>
+    </mc:Choice>
+    <mc:Fallback xmlns="">
+      <p:transition spd="med">
+        <p:fade/>
+      </p:transition>
+    </mc:Fallback>
+  </mc:AlternateContent>
+</p:sld>
+</file>
+
+<file path=ppt/slides/slide11.xml><?xml version="1.0" encoding="utf-8"?>
 <p:sld xmlns:a="http://schemas.openxmlformats.org/drawingml/2006/main" xmlns:r="http://schemas.openxmlformats.org/officeDocument/2006/relationships" xmlns:p="http://schemas.openxmlformats.org/presentationml/2006/main">
   <p:cSld>
     <p:bg>
@@ -4329,7 +4573,7 @@
 </p:sld>
 </file>
 
-<file path=ppt/slides/slide11.xml><?xml version="1.0" encoding="utf-8"?>
+<file path=ppt/slides/slide12.xml><?xml version="1.0" encoding="utf-8"?>
 <p:sld xmlns:a="http://schemas.openxmlformats.org/drawingml/2006/main" xmlns:r="http://schemas.openxmlformats.org/officeDocument/2006/relationships" xmlns:p="http://schemas.openxmlformats.org/presentationml/2006/main">
   <p:cSld>
     <p:bg>
@@ -5336,6 +5580,209 @@
 <file path=ppt/slides/slide2.xml><?xml version="1.0" encoding="utf-8"?>
 <p:sld xmlns:a="http://schemas.openxmlformats.org/drawingml/2006/main" xmlns:r="http://schemas.openxmlformats.org/officeDocument/2006/relationships" xmlns:p="http://schemas.openxmlformats.org/presentationml/2006/main">
   <p:cSld>
+    <p:spTree>
+      <p:nvGrpSpPr>
+        <p:cNvPr id="1" name=""/>
+        <p:cNvGrpSpPr/>
+        <p:nvPr/>
+      </p:nvGrpSpPr>
+      <p:grpSpPr>
+        <a:xfrm>
+          <a:off x="0" y="0"/>
+          <a:ext cx="0" cy="0"/>
+          <a:chOff x="0" y="0"/>
+          <a:chExt cx="0" cy="0"/>
+        </a:xfrm>
+      </p:grpSpPr>
+      <p:sp>
+        <p:nvSpPr>
+          <p:cNvPr id="2" name="Title 1">
+            <a:extLst>
+              <a:ext uri="{FF2B5EF4-FFF2-40B4-BE49-F238E27FC236}">
+                <a16:creationId xmlns:a16="http://schemas.microsoft.com/office/drawing/2014/main" id="{EA979EE3-C65B-4363-BEE4-7311CC8A7E7E}"/>
+              </a:ext>
+            </a:extLst>
+          </p:cNvPr>
+          <p:cNvSpPr>
+            <a:spLocks noGrp="1"/>
+          </p:cNvSpPr>
+          <p:nvPr>
+            <p:ph type="title"/>
+          </p:nvPr>
+        </p:nvSpPr>
+        <p:spPr/>
+        <p:txBody>
+          <a:bodyPr/>
+          <a:lstStyle/>
+          <a:p>
+            <a:r>
+              <a:rPr lang="en-US" dirty="0"/>
+              <a:t>About Caleb Trachte</a:t>
+            </a:r>
+          </a:p>
+        </p:txBody>
+      </p:sp>
+      <p:sp>
+        <p:nvSpPr>
+          <p:cNvPr id="3" name="Content Placeholder 2">
+            <a:extLst>
+              <a:ext uri="{FF2B5EF4-FFF2-40B4-BE49-F238E27FC236}">
+                <a16:creationId xmlns:a16="http://schemas.microsoft.com/office/drawing/2014/main" id="{41284B8E-885B-44FB-B413-C07B1E05C963}"/>
+              </a:ext>
+            </a:extLst>
+          </p:cNvPr>
+          <p:cNvSpPr>
+            <a:spLocks noGrp="1"/>
+          </p:cNvSpPr>
+          <p:nvPr>
+            <p:ph idx="1"/>
+          </p:nvPr>
+        </p:nvSpPr>
+        <p:spPr/>
+        <p:txBody>
+          <a:bodyPr/>
+          <a:lstStyle/>
+          <a:p>
+            <a:pPr marL="0" indent="0">
+              <a:buNone/>
+            </a:pPr>
+            <a:r>
+              <a:rPr lang="en-US" dirty="0">
+                <a:latin typeface="+mj-lt"/>
+              </a:rPr>
+              <a:t>- Originally from Newberg, Oregon – Now live in Cabot, AR.</a:t>
+            </a:r>
+          </a:p>
+          <a:p>
+            <a:pPr>
+              <a:buFontTx/>
+              <a:buChar char="-"/>
+            </a:pPr>
+            <a:r>
+              <a:rPr lang="en-US" dirty="0">
+                <a:latin typeface="+mj-lt"/>
+              </a:rPr>
+              <a:t>Co-organizer of CAJ</a:t>
+            </a:r>
+          </a:p>
+          <a:p>
+            <a:pPr>
+              <a:buFontTx/>
+              <a:buChar char="-"/>
+            </a:pPr>
+            <a:r>
+              <a:rPr lang="en-US" dirty="0">
+                <a:latin typeface="+mj-lt"/>
+              </a:rPr>
+              <a:t>Full-stack developer for a government contract which manages an enterprise-scale education software application (~2 years)</a:t>
+            </a:r>
+          </a:p>
+          <a:p>
+            <a:pPr>
+              <a:buFontTx/>
+              <a:buChar char="-"/>
+            </a:pPr>
+            <a:r>
+              <a:rPr lang="en-US" dirty="0">
+                <a:latin typeface="+mj-lt"/>
+              </a:rPr>
+              <a:t>B.S. Chemistry, MBA Cybersecurity Management</a:t>
+            </a:r>
+          </a:p>
+          <a:p>
+            <a:pPr>
+              <a:buFontTx/>
+              <a:buChar char="-"/>
+            </a:pPr>
+            <a:r>
+              <a:rPr lang="en-US" dirty="0">
+                <a:latin typeface="+mj-lt"/>
+              </a:rPr>
+              <a:t>Learned full-stack development through Udacity and Bloc</a:t>
+            </a:r>
+          </a:p>
+          <a:p>
+            <a:pPr>
+              <a:buFontTx/>
+              <a:buChar char="-"/>
+            </a:pPr>
+            <a:r>
+              <a:rPr lang="en-US" dirty="0">
+                <a:latin typeface="+mj-lt"/>
+              </a:rPr>
+              <a:t>Hobbies include writing code, travel, kayaking, fishing, making hot sauce, and League of Legends</a:t>
+            </a:r>
+          </a:p>
+          <a:p>
+            <a:pPr marL="0" indent="0">
+              <a:buNone/>
+            </a:pPr>
+            <a:r>
+              <a:rPr lang="en-US" dirty="0">
+                <a:latin typeface="+mj-lt"/>
+              </a:rPr>
+              <a:t>GitHub: </a:t>
+            </a:r>
+            <a:r>
+              <a:rPr lang="en-US" dirty="0">
+                <a:hlinkClick r:id="rId2"/>
+              </a:rPr>
+              <a:t>https://github.com/ctrachte</a:t>
+            </a:r>
+            <a:r>
+              <a:rPr lang="en-US" dirty="0"/>
+              <a:t> (also where this presentation is)</a:t>
+            </a:r>
+            <a:endParaRPr lang="en-US" dirty="0">
+              <a:latin typeface="+mj-lt"/>
+            </a:endParaRPr>
+          </a:p>
+        </p:txBody>
+      </p:sp>
+      <p:sp>
+        <p:nvSpPr>
+          <p:cNvPr id="4" name="Footer Placeholder 3">
+            <a:extLst>
+              <a:ext uri="{FF2B5EF4-FFF2-40B4-BE49-F238E27FC236}">
+                <a16:creationId xmlns:a16="http://schemas.microsoft.com/office/drawing/2014/main" id="{A85FF8D9-4D2A-4943-B094-9672F184D07B}"/>
+              </a:ext>
+            </a:extLst>
+          </p:cNvPr>
+          <p:cNvSpPr>
+            <a:spLocks noGrp="1"/>
+          </p:cNvSpPr>
+          <p:nvPr>
+            <p:ph type="ftr" sz="quarter" idx="11"/>
+          </p:nvPr>
+        </p:nvSpPr>
+        <p:spPr/>
+        <p:txBody>
+          <a:bodyPr/>
+          <a:lstStyle/>
+          <a:p>
+            <a:r>
+              <a:rPr lang="en-US"/>
+              <a:t>[Goulding, 2020](https://stackoverflow.blog/2020/01/20/what-is-rust-and-why-is-it-so-popular/)</a:t>
+            </a:r>
+          </a:p>
+        </p:txBody>
+      </p:sp>
+    </p:spTree>
+    <p:extLst>
+      <p:ext uri="{BB962C8B-B14F-4D97-AF65-F5344CB8AC3E}">
+        <p14:creationId xmlns:p14="http://schemas.microsoft.com/office/powerpoint/2010/main" val="2937423041"/>
+      </p:ext>
+    </p:extLst>
+  </p:cSld>
+  <p:clrMapOvr>
+    <a:masterClrMapping/>
+  </p:clrMapOvr>
+</p:sld>
+</file>
+
+<file path=ppt/slides/slide3.xml><?xml version="1.0" encoding="utf-8"?>
+<p:sld xmlns:a="http://schemas.openxmlformats.org/drawingml/2006/main" xmlns:r="http://schemas.openxmlformats.org/officeDocument/2006/relationships" xmlns:p="http://schemas.openxmlformats.org/presentationml/2006/main">
+  <p:cSld>
     <p:bg>
       <p:bgPr>
         <a:solidFill>
@@ -5995,7 +6442,7 @@
 </p:sld>
 </file>
 
-<file path=ppt/slides/slide3.xml><?xml version="1.0" encoding="utf-8"?>
+<file path=ppt/slides/slide4.xml><?xml version="1.0" encoding="utf-8"?>
 <p:sld xmlns:a="http://schemas.openxmlformats.org/drawingml/2006/main" xmlns:r="http://schemas.openxmlformats.org/officeDocument/2006/relationships" xmlns:p="http://schemas.openxmlformats.org/presentationml/2006/main">
   <p:cSld>
     <p:bg>
@@ -6992,7 +7439,7 @@
 </p:sld>
 </file>
 
-<file path=ppt/slides/slide4.xml><?xml version="1.0" encoding="utf-8"?>
+<file path=ppt/slides/slide5.xml><?xml version="1.0" encoding="utf-8"?>
 <p:sld xmlns:a="http://schemas.openxmlformats.org/drawingml/2006/main" xmlns:r="http://schemas.openxmlformats.org/officeDocument/2006/relationships" xmlns:p="http://schemas.openxmlformats.org/presentationml/2006/main">
   <p:cSld>
     <p:bg>
@@ -7757,7 +8204,7 @@
 </p:sld>
 </file>
 
-<file path=ppt/slides/slide5.xml><?xml version="1.0" encoding="utf-8"?>
+<file path=ppt/slides/slide6.xml><?xml version="1.0" encoding="utf-8"?>
 <p:sld xmlns:a="http://schemas.openxmlformats.org/drawingml/2006/main" xmlns:r="http://schemas.openxmlformats.org/officeDocument/2006/relationships" xmlns:p="http://schemas.openxmlformats.org/presentationml/2006/main">
   <p:cSld>
     <p:bg>
@@ -8762,7 +9209,7 @@
 </p:sld>
 </file>
 
-<file path=ppt/slides/slide6.xml><?xml version="1.0" encoding="utf-8"?>
+<file path=ppt/slides/slide7.xml><?xml version="1.0" encoding="utf-8"?>
 <p:sld xmlns:a="http://schemas.openxmlformats.org/drawingml/2006/main" xmlns:r="http://schemas.openxmlformats.org/officeDocument/2006/relationships" xmlns:p="http://schemas.openxmlformats.org/presentationml/2006/main">
   <p:cSld>
     <p:bg>
@@ -9042,7 +9489,7 @@
 </p:sld>
 </file>
 
-<file path=ppt/slides/slide7.xml><?xml version="1.0" encoding="utf-8"?>
+<file path=ppt/slides/slide8.xml><?xml version="1.0" encoding="utf-8"?>
 <p:sld xmlns:a="http://schemas.openxmlformats.org/drawingml/2006/main" xmlns:r="http://schemas.openxmlformats.org/officeDocument/2006/relationships" xmlns:p="http://schemas.openxmlformats.org/presentationml/2006/main">
   <p:cSld>
     <p:bg>
@@ -9611,7 +10058,7 @@
 </p:sld>
 </file>
 
-<file path=ppt/slides/slide8.xml><?xml version="1.0" encoding="utf-8"?>
+<file path=ppt/slides/slide9.xml><?xml version="1.0" encoding="utf-8"?>
 <p:sld xmlns:a="http://schemas.openxmlformats.org/drawingml/2006/main" xmlns:r="http://schemas.openxmlformats.org/officeDocument/2006/relationships" xmlns:p="http://schemas.openxmlformats.org/presentationml/2006/main">
   <p:cSld>
     <p:bg>
@@ -9824,206 +10271,6 @@
     <p:extLst>
       <p:ext uri="{BB962C8B-B14F-4D97-AF65-F5344CB8AC3E}">
         <p14:creationId xmlns:p14="http://schemas.microsoft.com/office/powerpoint/2010/main" val="985327731"/>
-      </p:ext>
-    </p:extLst>
-  </p:cSld>
-  <p:clrMapOvr>
-    <a:masterClrMapping/>
-  </p:clrMapOvr>
-  <mc:AlternateContent xmlns:mc="http://schemas.openxmlformats.org/markup-compatibility/2006" xmlns:p14="http://schemas.microsoft.com/office/powerpoint/2010/main">
-    <mc:Choice Requires="p14">
-      <p:transition spd="med" p14:dur="700">
-        <p:fade/>
-      </p:transition>
-    </mc:Choice>
-    <mc:Fallback xmlns="">
-      <p:transition spd="med">
-        <p:fade/>
-      </p:transition>
-    </mc:Fallback>
-  </mc:AlternateContent>
-</p:sld>
-</file>
-
-<file path=ppt/slides/slide9.xml><?xml version="1.0" encoding="utf-8"?>
-<p:sld xmlns:a="http://schemas.openxmlformats.org/drawingml/2006/main" xmlns:r="http://schemas.openxmlformats.org/officeDocument/2006/relationships" xmlns:p="http://schemas.openxmlformats.org/presentationml/2006/main">
-  <p:cSld>
-    <p:bg>
-      <p:bgPr>
-        <a:solidFill>
-          <a:schemeClr val="bg1"/>
-        </a:solidFill>
-        <a:effectLst/>
-      </p:bgPr>
-    </p:bg>
-    <p:spTree>
-      <p:nvGrpSpPr>
-        <p:cNvPr id="1" name=""/>
-        <p:cNvGrpSpPr/>
-        <p:nvPr/>
-      </p:nvGrpSpPr>
-      <p:grpSpPr>
-        <a:xfrm>
-          <a:off x="0" y="0"/>
-          <a:ext cx="0" cy="0"/>
-          <a:chOff x="0" y="0"/>
-          <a:chExt cx="0" cy="0"/>
-        </a:xfrm>
-      </p:grpSpPr>
-      <p:sp>
-        <p:nvSpPr>
-          <p:cNvPr id="2" name="Title 1">
-            <a:extLst>
-              <a:ext uri="{FF2B5EF4-FFF2-40B4-BE49-F238E27FC236}">
-                <a16:creationId xmlns:a16="http://schemas.microsoft.com/office/drawing/2014/main" id="{E4326CFC-8929-4EAA-AACB-65A09AC72B19}"/>
-              </a:ext>
-            </a:extLst>
-          </p:cNvPr>
-          <p:cNvSpPr>
-            <a:spLocks noGrp="1"/>
-          </p:cNvSpPr>
-          <p:nvPr>
-            <p:ph type="title"/>
-          </p:nvPr>
-        </p:nvSpPr>
-        <p:spPr>
-          <a:xfrm>
-            <a:off x="838200" y="365125"/>
-            <a:ext cx="10515600" cy="1325563"/>
-          </a:xfrm>
-        </p:spPr>
-        <p:txBody>
-          <a:bodyPr vert="horz" lIns="91440" tIns="45720" rIns="91440" bIns="45720" rtlCol="0" anchor="ctr">
-            <a:normAutofit/>
-          </a:bodyPr>
-          <a:lstStyle/>
-          <a:p>
-            <a:pPr algn="ctr"/>
-            <a:r>
-              <a:rPr lang="en-US" kern="1200">
-                <a:solidFill>
-                  <a:schemeClr val="tx1"/>
-                </a:solidFill>
-                <a:latin typeface="+mj-lt"/>
-                <a:ea typeface="+mj-ea"/>
-                <a:cs typeface="+mj-cs"/>
-              </a:rPr>
-              <a:t>Shadowing</a:t>
-            </a:r>
-            <a:endParaRPr lang="en-US" kern="1200" dirty="0">
-              <a:solidFill>
-                <a:schemeClr val="tx1"/>
-              </a:solidFill>
-              <a:latin typeface="+mj-lt"/>
-              <a:ea typeface="+mj-ea"/>
-              <a:cs typeface="+mj-cs"/>
-            </a:endParaRPr>
-          </a:p>
-        </p:txBody>
-      </p:sp>
-      <p:pic>
-        <p:nvPicPr>
-          <p:cNvPr id="5" name="Picture 4" descr="A screenshot of a cell phone&#10;&#10;Description automatically generated">
-            <a:extLst>
-              <a:ext uri="{FF2B5EF4-FFF2-40B4-BE49-F238E27FC236}">
-                <a16:creationId xmlns:a16="http://schemas.microsoft.com/office/drawing/2014/main" id="{36860D48-756D-4CE3-BEEF-CBF2FA115799}"/>
-              </a:ext>
-            </a:extLst>
-          </p:cNvPr>
-          <p:cNvPicPr>
-            <a:picLocks noChangeAspect="1"/>
-          </p:cNvPicPr>
-          <p:nvPr/>
-        </p:nvPicPr>
-        <p:blipFill>
-          <a:blip r:embed="rId2">
-            <a:extLst>
-              <a:ext uri="{28A0092B-C50C-407E-A947-70E740481C1C}">
-                <a14:useLocalDpi xmlns:a14="http://schemas.microsoft.com/office/drawing/2010/main" val="0"/>
-              </a:ext>
-            </a:extLst>
-          </a:blip>
-          <a:stretch>
-            <a:fillRect/>
-          </a:stretch>
-        </p:blipFill>
-        <p:spPr>
-          <a:xfrm>
-            <a:off x="828675" y="2106773"/>
-            <a:ext cx="10525125" cy="3789043"/>
-          </a:xfrm>
-          <a:prstGeom prst="rect">
-            <a:avLst/>
-          </a:prstGeom>
-        </p:spPr>
-      </p:pic>
-      <p:sp>
-        <p:nvSpPr>
-          <p:cNvPr id="4" name="Footer Placeholder 3">
-            <a:extLst>
-              <a:ext uri="{FF2B5EF4-FFF2-40B4-BE49-F238E27FC236}">
-                <a16:creationId xmlns:a16="http://schemas.microsoft.com/office/drawing/2014/main" id="{983E1BA2-D9FD-41BC-AC0D-55687EE8BF9E}"/>
-              </a:ext>
-            </a:extLst>
-          </p:cNvPr>
-          <p:cNvSpPr>
-            <a:spLocks noGrp="1"/>
-          </p:cNvSpPr>
-          <p:nvPr>
-            <p:ph type="ftr" sz="quarter" idx="11"/>
-          </p:nvPr>
-        </p:nvSpPr>
-        <p:spPr>
-          <a:xfrm>
-            <a:off x="4033837" y="1411125"/>
-            <a:ext cx="4114800" cy="365125"/>
-          </a:xfrm>
-        </p:spPr>
-        <p:txBody>
-          <a:bodyPr vert="horz" lIns="91440" tIns="45720" rIns="91440" bIns="45720" rtlCol="0" anchor="ctr">
-            <a:normAutofit/>
-          </a:bodyPr>
-          <a:lstStyle/>
-          <a:p>
-            <a:pPr>
-              <a:lnSpc>
-                <a:spcPct val="90000"/>
-              </a:lnSpc>
-              <a:spcAft>
-                <a:spcPts val="600"/>
-              </a:spcAft>
-            </a:pPr>
-            <a:r>
-              <a:rPr lang="en-US" sz="1000" kern="1200" dirty="0">
-                <a:solidFill>
-                  <a:schemeClr val="tx1">
-                    <a:tint val="75000"/>
-                  </a:schemeClr>
-                </a:solidFill>
-                <a:latin typeface="+mn-lt"/>
-                <a:ea typeface="+mn-ea"/>
-                <a:cs typeface="+mn-cs"/>
-                <a:hlinkClick r:id="rId3"/>
-              </a:rPr>
-              <a:t> https://doc.rust-lang.org/book/ch03-01-variables-and-mutability.html</a:t>
-            </a:r>
-            <a:endParaRPr lang="en-US" sz="1000" kern="1200" dirty="0">
-              <a:solidFill>
-                <a:schemeClr val="tx1">
-                  <a:tint val="75000"/>
-                </a:schemeClr>
-              </a:solidFill>
-              <a:latin typeface="+mn-lt"/>
-              <a:ea typeface="+mn-ea"/>
-              <a:cs typeface="+mn-cs"/>
-            </a:endParaRPr>
-          </a:p>
-        </p:txBody>
-      </p:sp>
-    </p:spTree>
-    <p:extLst>
-      <p:ext uri="{BB962C8B-B14F-4D97-AF65-F5344CB8AC3E}">
-        <p14:creationId xmlns:p14="http://schemas.microsoft.com/office/powerpoint/2010/main" val="3758640645"/>
       </p:ext>
     </p:extLst>
   </p:cSld>

</xml_diff>